<commit_message>
Adicionando slides design do algoritmo
</commit_message>
<xml_diff>
--- a/XGBOD-Seminar/XGBOD-Seminar.pptx
+++ b/XGBOD-Seminar/XGBOD-Seminar.pptx
@@ -5,7 +5,7 @@
     <p:sldMasterId id="2147483660" r:id="rId1"/>
   </p:sldMasterIdLst>
   <p:notesMasterIdLst>
-    <p:notesMasterId r:id="rId20"/>
+    <p:notesMasterId r:id="rId33"/>
   </p:notesMasterIdLst>
   <p:sldIdLst>
     <p:sldId id="256" r:id="rId2"/>
@@ -13,19 +13,32 @@
     <p:sldId id="265" r:id="rId4"/>
     <p:sldId id="267" r:id="rId5"/>
     <p:sldId id="268" r:id="rId6"/>
-    <p:sldId id="269" r:id="rId7"/>
-    <p:sldId id="270" r:id="rId8"/>
-    <p:sldId id="271" r:id="rId9"/>
-    <p:sldId id="274" r:id="rId10"/>
-    <p:sldId id="272" r:id="rId11"/>
-    <p:sldId id="262" r:id="rId12"/>
-    <p:sldId id="273" r:id="rId13"/>
-    <p:sldId id="259" r:id="rId14"/>
-    <p:sldId id="260" r:id="rId15"/>
-    <p:sldId id="264" r:id="rId16"/>
-    <p:sldId id="266" r:id="rId17"/>
-    <p:sldId id="263" r:id="rId18"/>
-    <p:sldId id="258" r:id="rId19"/>
+    <p:sldId id="275" r:id="rId7"/>
+    <p:sldId id="276" r:id="rId8"/>
+    <p:sldId id="277" r:id="rId9"/>
+    <p:sldId id="278" r:id="rId10"/>
+    <p:sldId id="279" r:id="rId11"/>
+    <p:sldId id="280" r:id="rId12"/>
+    <p:sldId id="281" r:id="rId13"/>
+    <p:sldId id="282" r:id="rId14"/>
+    <p:sldId id="283" r:id="rId15"/>
+    <p:sldId id="284" r:id="rId16"/>
+    <p:sldId id="285" r:id="rId17"/>
+    <p:sldId id="286" r:id="rId18"/>
+    <p:sldId id="287" r:id="rId19"/>
+    <p:sldId id="269" r:id="rId20"/>
+    <p:sldId id="270" r:id="rId21"/>
+    <p:sldId id="271" r:id="rId22"/>
+    <p:sldId id="274" r:id="rId23"/>
+    <p:sldId id="272" r:id="rId24"/>
+    <p:sldId id="262" r:id="rId25"/>
+    <p:sldId id="273" r:id="rId26"/>
+    <p:sldId id="259" r:id="rId27"/>
+    <p:sldId id="260" r:id="rId28"/>
+    <p:sldId id="264" r:id="rId29"/>
+    <p:sldId id="266" r:id="rId30"/>
+    <p:sldId id="263" r:id="rId31"/>
+    <p:sldId id="258" r:id="rId32"/>
   </p:sldIdLst>
   <p:sldSz cx="9144000" cy="6858000" type="screen4x3"/>
   <p:notesSz cx="6858000" cy="9144000"/>
@@ -214,7 +227,7 @@
           <a:p>
             <a:fld id="{1C43085D-9175-4FDA-8BB7-47504762CD05}" type="datetimeFigureOut">
               <a:rPr lang="pt-BR" smtClean="0"/>
-              <a:t>06/10/2019</a:t>
+              <a:t>13/10/2019</a:t>
             </a:fld>
             <a:endParaRPr lang="pt-BR"/>
           </a:p>
@@ -547,7 +560,427 @@
           <a:p>
             <a:fld id="{463941E7-EB35-4884-B9D7-7CF822459A30}" type="slidenum">
               <a:rPr lang="pt-BR" smtClean="0"/>
-              <a:t>9</a:t>
+              <a:t>6</a:t>
+            </a:fld>
+            <a:endParaRPr lang="pt-BR"/>
+          </a:p>
+        </p:txBody>
+      </p:sp>
+    </p:spTree>
+    <p:extLst>
+      <p:ext uri="{BB962C8B-B14F-4D97-AF65-F5344CB8AC3E}">
+        <p14:creationId xmlns:p14="http://schemas.microsoft.com/office/powerpoint/2010/main" val="1426869845"/>
+      </p:ext>
+    </p:extLst>
+  </p:cSld>
+  <p:clrMapOvr>
+    <a:masterClrMapping/>
+  </p:clrMapOvr>
+</p:notes>
+</file>
+
+<file path=ppt/notesSlides/notesSlide10.xml><?xml version="1.0" encoding="utf-8"?>
+<p:notes xmlns:a="http://schemas.openxmlformats.org/drawingml/2006/main" xmlns:r="http://schemas.openxmlformats.org/officeDocument/2006/relationships" xmlns:p="http://schemas.openxmlformats.org/presentationml/2006/main">
+  <p:cSld>
+    <p:spTree>
+      <p:nvGrpSpPr>
+        <p:cNvPr id="1" name=""/>
+        <p:cNvGrpSpPr/>
+        <p:nvPr/>
+      </p:nvGrpSpPr>
+      <p:grpSpPr>
+        <a:xfrm>
+          <a:off x="0" y="0"/>
+          <a:ext cx="0" cy="0"/>
+          <a:chOff x="0" y="0"/>
+          <a:chExt cx="0" cy="0"/>
+        </a:xfrm>
+      </p:grpSpPr>
+      <p:sp>
+        <p:nvSpPr>
+          <p:cNvPr id="2" name="Espaço Reservado para Imagem de Slide 1"/>
+          <p:cNvSpPr>
+            <a:spLocks noGrp="1" noRot="1" noChangeAspect="1"/>
+          </p:cNvSpPr>
+          <p:nvPr>
+            <p:ph type="sldImg"/>
+          </p:nvPr>
+        </p:nvSpPr>
+        <p:spPr/>
+      </p:sp>
+      <p:sp>
+        <p:nvSpPr>
+          <p:cNvPr id="3" name="Espaço Reservado para Anotações 2"/>
+          <p:cNvSpPr>
+            <a:spLocks noGrp="1"/>
+          </p:cNvSpPr>
+          <p:nvPr>
+            <p:ph type="body" idx="1"/>
+          </p:nvPr>
+        </p:nvSpPr>
+        <p:spPr/>
+        <p:txBody>
+          <a:bodyPr/>
+          <a:lstStyle/>
+          <a:p>
+            <a:endParaRPr lang="pt-BR" dirty="0"/>
+          </a:p>
+        </p:txBody>
+      </p:sp>
+      <p:sp>
+        <p:nvSpPr>
+          <p:cNvPr id="4" name="Espaço Reservado para Número de Slide 3"/>
+          <p:cNvSpPr>
+            <a:spLocks noGrp="1"/>
+          </p:cNvSpPr>
+          <p:nvPr>
+            <p:ph type="sldNum" sz="quarter" idx="10"/>
+          </p:nvPr>
+        </p:nvSpPr>
+        <p:spPr/>
+        <p:txBody>
+          <a:bodyPr/>
+          <a:lstStyle/>
+          <a:p>
+            <a:fld id="{463941E7-EB35-4884-B9D7-7CF822459A30}" type="slidenum">
+              <a:rPr lang="pt-BR" smtClean="0"/>
+              <a:t>15</a:t>
+            </a:fld>
+            <a:endParaRPr lang="pt-BR"/>
+          </a:p>
+        </p:txBody>
+      </p:sp>
+    </p:spTree>
+    <p:extLst>
+      <p:ext uri="{BB962C8B-B14F-4D97-AF65-F5344CB8AC3E}">
+        <p14:creationId xmlns:p14="http://schemas.microsoft.com/office/powerpoint/2010/main" val="3570941346"/>
+      </p:ext>
+    </p:extLst>
+  </p:cSld>
+  <p:clrMapOvr>
+    <a:masterClrMapping/>
+  </p:clrMapOvr>
+</p:notes>
+</file>
+
+<file path=ppt/notesSlides/notesSlide11.xml><?xml version="1.0" encoding="utf-8"?>
+<p:notes xmlns:a="http://schemas.openxmlformats.org/drawingml/2006/main" xmlns:r="http://schemas.openxmlformats.org/officeDocument/2006/relationships" xmlns:p="http://schemas.openxmlformats.org/presentationml/2006/main">
+  <p:cSld>
+    <p:spTree>
+      <p:nvGrpSpPr>
+        <p:cNvPr id="1" name=""/>
+        <p:cNvGrpSpPr/>
+        <p:nvPr/>
+      </p:nvGrpSpPr>
+      <p:grpSpPr>
+        <a:xfrm>
+          <a:off x="0" y="0"/>
+          <a:ext cx="0" cy="0"/>
+          <a:chOff x="0" y="0"/>
+          <a:chExt cx="0" cy="0"/>
+        </a:xfrm>
+      </p:grpSpPr>
+      <p:sp>
+        <p:nvSpPr>
+          <p:cNvPr id="2" name="Espaço Reservado para Imagem de Slide 1"/>
+          <p:cNvSpPr>
+            <a:spLocks noGrp="1" noRot="1" noChangeAspect="1"/>
+          </p:cNvSpPr>
+          <p:nvPr>
+            <p:ph type="sldImg"/>
+          </p:nvPr>
+        </p:nvSpPr>
+        <p:spPr/>
+      </p:sp>
+      <p:sp>
+        <p:nvSpPr>
+          <p:cNvPr id="3" name="Espaço Reservado para Anotações 2"/>
+          <p:cNvSpPr>
+            <a:spLocks noGrp="1"/>
+          </p:cNvSpPr>
+          <p:nvPr>
+            <p:ph type="body" idx="1"/>
+          </p:nvPr>
+        </p:nvSpPr>
+        <p:spPr/>
+        <p:txBody>
+          <a:bodyPr/>
+          <a:lstStyle/>
+          <a:p>
+            <a:endParaRPr lang="pt-BR" dirty="0"/>
+          </a:p>
+        </p:txBody>
+      </p:sp>
+      <p:sp>
+        <p:nvSpPr>
+          <p:cNvPr id="4" name="Espaço Reservado para Número de Slide 3"/>
+          <p:cNvSpPr>
+            <a:spLocks noGrp="1"/>
+          </p:cNvSpPr>
+          <p:nvPr>
+            <p:ph type="sldNum" sz="quarter" idx="10"/>
+          </p:nvPr>
+        </p:nvSpPr>
+        <p:spPr/>
+        <p:txBody>
+          <a:bodyPr/>
+          <a:lstStyle/>
+          <a:p>
+            <a:fld id="{463941E7-EB35-4884-B9D7-7CF822459A30}" type="slidenum">
+              <a:rPr lang="pt-BR" smtClean="0"/>
+              <a:t>16</a:t>
+            </a:fld>
+            <a:endParaRPr lang="pt-BR"/>
+          </a:p>
+        </p:txBody>
+      </p:sp>
+    </p:spTree>
+    <p:extLst>
+      <p:ext uri="{BB962C8B-B14F-4D97-AF65-F5344CB8AC3E}">
+        <p14:creationId xmlns:p14="http://schemas.microsoft.com/office/powerpoint/2010/main" val="959605358"/>
+      </p:ext>
+    </p:extLst>
+  </p:cSld>
+  <p:clrMapOvr>
+    <a:masterClrMapping/>
+  </p:clrMapOvr>
+</p:notes>
+</file>
+
+<file path=ppt/notesSlides/notesSlide12.xml><?xml version="1.0" encoding="utf-8"?>
+<p:notes xmlns:a="http://schemas.openxmlformats.org/drawingml/2006/main" xmlns:r="http://schemas.openxmlformats.org/officeDocument/2006/relationships" xmlns:p="http://schemas.openxmlformats.org/presentationml/2006/main">
+  <p:cSld>
+    <p:spTree>
+      <p:nvGrpSpPr>
+        <p:cNvPr id="1" name=""/>
+        <p:cNvGrpSpPr/>
+        <p:nvPr/>
+      </p:nvGrpSpPr>
+      <p:grpSpPr>
+        <a:xfrm>
+          <a:off x="0" y="0"/>
+          <a:ext cx="0" cy="0"/>
+          <a:chOff x="0" y="0"/>
+          <a:chExt cx="0" cy="0"/>
+        </a:xfrm>
+      </p:grpSpPr>
+      <p:sp>
+        <p:nvSpPr>
+          <p:cNvPr id="2" name="Espaço Reservado para Imagem de Slide 1"/>
+          <p:cNvSpPr>
+            <a:spLocks noGrp="1" noRot="1" noChangeAspect="1"/>
+          </p:cNvSpPr>
+          <p:nvPr>
+            <p:ph type="sldImg"/>
+          </p:nvPr>
+        </p:nvSpPr>
+        <p:spPr/>
+      </p:sp>
+      <p:sp>
+        <p:nvSpPr>
+          <p:cNvPr id="3" name="Espaço Reservado para Anotações 2"/>
+          <p:cNvSpPr>
+            <a:spLocks noGrp="1"/>
+          </p:cNvSpPr>
+          <p:nvPr>
+            <p:ph type="body" idx="1"/>
+          </p:nvPr>
+        </p:nvSpPr>
+        <p:spPr/>
+        <p:txBody>
+          <a:bodyPr/>
+          <a:lstStyle/>
+          <a:p>
+            <a:endParaRPr lang="pt-BR" dirty="0"/>
+          </a:p>
+        </p:txBody>
+      </p:sp>
+      <p:sp>
+        <p:nvSpPr>
+          <p:cNvPr id="4" name="Espaço Reservado para Número de Slide 3"/>
+          <p:cNvSpPr>
+            <a:spLocks noGrp="1"/>
+          </p:cNvSpPr>
+          <p:nvPr>
+            <p:ph type="sldNum" sz="quarter" idx="10"/>
+          </p:nvPr>
+        </p:nvSpPr>
+        <p:spPr/>
+        <p:txBody>
+          <a:bodyPr/>
+          <a:lstStyle/>
+          <a:p>
+            <a:fld id="{463941E7-EB35-4884-B9D7-7CF822459A30}" type="slidenum">
+              <a:rPr lang="pt-BR" smtClean="0"/>
+              <a:t>17</a:t>
+            </a:fld>
+            <a:endParaRPr lang="pt-BR"/>
+          </a:p>
+        </p:txBody>
+      </p:sp>
+    </p:spTree>
+    <p:extLst>
+      <p:ext uri="{BB962C8B-B14F-4D97-AF65-F5344CB8AC3E}">
+        <p14:creationId xmlns:p14="http://schemas.microsoft.com/office/powerpoint/2010/main" val="3406229403"/>
+      </p:ext>
+    </p:extLst>
+  </p:cSld>
+  <p:clrMapOvr>
+    <a:masterClrMapping/>
+  </p:clrMapOvr>
+</p:notes>
+</file>
+
+<file path=ppt/notesSlides/notesSlide13.xml><?xml version="1.0" encoding="utf-8"?>
+<p:notes xmlns:a="http://schemas.openxmlformats.org/drawingml/2006/main" xmlns:r="http://schemas.openxmlformats.org/officeDocument/2006/relationships" xmlns:p="http://schemas.openxmlformats.org/presentationml/2006/main">
+  <p:cSld>
+    <p:spTree>
+      <p:nvGrpSpPr>
+        <p:cNvPr id="1" name=""/>
+        <p:cNvGrpSpPr/>
+        <p:nvPr/>
+      </p:nvGrpSpPr>
+      <p:grpSpPr>
+        <a:xfrm>
+          <a:off x="0" y="0"/>
+          <a:ext cx="0" cy="0"/>
+          <a:chOff x="0" y="0"/>
+          <a:chExt cx="0" cy="0"/>
+        </a:xfrm>
+      </p:grpSpPr>
+      <p:sp>
+        <p:nvSpPr>
+          <p:cNvPr id="2" name="Espaço Reservado para Imagem de Slide 1"/>
+          <p:cNvSpPr>
+            <a:spLocks noGrp="1" noRot="1" noChangeAspect="1"/>
+          </p:cNvSpPr>
+          <p:nvPr>
+            <p:ph type="sldImg"/>
+          </p:nvPr>
+        </p:nvSpPr>
+        <p:spPr/>
+      </p:sp>
+      <p:sp>
+        <p:nvSpPr>
+          <p:cNvPr id="3" name="Espaço Reservado para Anotações 2"/>
+          <p:cNvSpPr>
+            <a:spLocks noGrp="1"/>
+          </p:cNvSpPr>
+          <p:nvPr>
+            <p:ph type="body" idx="1"/>
+          </p:nvPr>
+        </p:nvSpPr>
+        <p:spPr/>
+        <p:txBody>
+          <a:bodyPr/>
+          <a:lstStyle/>
+          <a:p>
+            <a:endParaRPr lang="pt-BR" dirty="0"/>
+          </a:p>
+        </p:txBody>
+      </p:sp>
+      <p:sp>
+        <p:nvSpPr>
+          <p:cNvPr id="4" name="Espaço Reservado para Número de Slide 3"/>
+          <p:cNvSpPr>
+            <a:spLocks noGrp="1"/>
+          </p:cNvSpPr>
+          <p:nvPr>
+            <p:ph type="sldNum" sz="quarter" idx="10"/>
+          </p:nvPr>
+        </p:nvSpPr>
+        <p:spPr/>
+        <p:txBody>
+          <a:bodyPr/>
+          <a:lstStyle/>
+          <a:p>
+            <a:fld id="{463941E7-EB35-4884-B9D7-7CF822459A30}" type="slidenum">
+              <a:rPr lang="pt-BR" smtClean="0"/>
+              <a:t>18</a:t>
+            </a:fld>
+            <a:endParaRPr lang="pt-BR"/>
+          </a:p>
+        </p:txBody>
+      </p:sp>
+    </p:spTree>
+    <p:extLst>
+      <p:ext uri="{BB962C8B-B14F-4D97-AF65-F5344CB8AC3E}">
+        <p14:creationId xmlns:p14="http://schemas.microsoft.com/office/powerpoint/2010/main" val="3781951231"/>
+      </p:ext>
+    </p:extLst>
+  </p:cSld>
+  <p:clrMapOvr>
+    <a:masterClrMapping/>
+  </p:clrMapOvr>
+</p:notes>
+</file>
+
+<file path=ppt/notesSlides/notesSlide14.xml><?xml version="1.0" encoding="utf-8"?>
+<p:notes xmlns:a="http://schemas.openxmlformats.org/drawingml/2006/main" xmlns:r="http://schemas.openxmlformats.org/officeDocument/2006/relationships" xmlns:p="http://schemas.openxmlformats.org/presentationml/2006/main">
+  <p:cSld>
+    <p:spTree>
+      <p:nvGrpSpPr>
+        <p:cNvPr id="1" name=""/>
+        <p:cNvGrpSpPr/>
+        <p:nvPr/>
+      </p:nvGrpSpPr>
+      <p:grpSpPr>
+        <a:xfrm>
+          <a:off x="0" y="0"/>
+          <a:ext cx="0" cy="0"/>
+          <a:chOff x="0" y="0"/>
+          <a:chExt cx="0" cy="0"/>
+        </a:xfrm>
+      </p:grpSpPr>
+      <p:sp>
+        <p:nvSpPr>
+          <p:cNvPr id="2" name="Espaço Reservado para Imagem de Slide 1"/>
+          <p:cNvSpPr>
+            <a:spLocks noGrp="1" noRot="1" noChangeAspect="1"/>
+          </p:cNvSpPr>
+          <p:nvPr>
+            <p:ph type="sldImg"/>
+          </p:nvPr>
+        </p:nvSpPr>
+        <p:spPr/>
+      </p:sp>
+      <p:sp>
+        <p:nvSpPr>
+          <p:cNvPr id="3" name="Espaço Reservado para Anotações 2"/>
+          <p:cNvSpPr>
+            <a:spLocks noGrp="1"/>
+          </p:cNvSpPr>
+          <p:nvPr>
+            <p:ph type="body" idx="1"/>
+          </p:nvPr>
+        </p:nvSpPr>
+        <p:spPr/>
+        <p:txBody>
+          <a:bodyPr/>
+          <a:lstStyle/>
+          <a:p>
+            <a:endParaRPr lang="pt-BR" dirty="0"/>
+          </a:p>
+        </p:txBody>
+      </p:sp>
+      <p:sp>
+        <p:nvSpPr>
+          <p:cNvPr id="4" name="Espaço Reservado para Número de Slide 3"/>
+          <p:cNvSpPr>
+            <a:spLocks noGrp="1"/>
+          </p:cNvSpPr>
+          <p:nvPr>
+            <p:ph type="sldNum" sz="quarter" idx="10"/>
+          </p:nvPr>
+        </p:nvSpPr>
+        <p:spPr/>
+        <p:txBody>
+          <a:bodyPr/>
+          <a:lstStyle/>
+          <a:p>
+            <a:fld id="{463941E7-EB35-4884-B9D7-7CF822459A30}" type="slidenum">
+              <a:rPr lang="pt-BR" smtClean="0"/>
+              <a:t>22</a:t>
             </a:fld>
             <a:endParaRPr lang="pt-BR"/>
           </a:p>
@@ -557,6 +990,258 @@
     <p:extLst>
       <p:ext uri="{BB962C8B-B14F-4D97-AF65-F5344CB8AC3E}">
         <p14:creationId xmlns:p14="http://schemas.microsoft.com/office/powerpoint/2010/main" val="4055491837"/>
+      </p:ext>
+    </p:extLst>
+  </p:cSld>
+  <p:clrMapOvr>
+    <a:masterClrMapping/>
+  </p:clrMapOvr>
+</p:notes>
+</file>
+
+<file path=ppt/notesSlides/notesSlide15.xml><?xml version="1.0" encoding="utf-8"?>
+<p:notes xmlns:a="http://schemas.openxmlformats.org/drawingml/2006/main" xmlns:r="http://schemas.openxmlformats.org/officeDocument/2006/relationships" xmlns:p="http://schemas.openxmlformats.org/presentationml/2006/main">
+  <p:cSld>
+    <p:spTree>
+      <p:nvGrpSpPr>
+        <p:cNvPr id="1" name=""/>
+        <p:cNvGrpSpPr/>
+        <p:nvPr/>
+      </p:nvGrpSpPr>
+      <p:grpSpPr>
+        <a:xfrm>
+          <a:off x="0" y="0"/>
+          <a:ext cx="0" cy="0"/>
+          <a:chOff x="0" y="0"/>
+          <a:chExt cx="0" cy="0"/>
+        </a:xfrm>
+      </p:grpSpPr>
+      <p:sp>
+        <p:nvSpPr>
+          <p:cNvPr id="2" name="Espaço Reservado para Imagem de Slide 1"/>
+          <p:cNvSpPr>
+            <a:spLocks noGrp="1" noRot="1" noChangeAspect="1"/>
+          </p:cNvSpPr>
+          <p:nvPr>
+            <p:ph type="sldImg"/>
+          </p:nvPr>
+        </p:nvSpPr>
+        <p:spPr/>
+      </p:sp>
+      <p:sp>
+        <p:nvSpPr>
+          <p:cNvPr id="3" name="Espaço Reservado para Anotações 2"/>
+          <p:cNvSpPr>
+            <a:spLocks noGrp="1"/>
+          </p:cNvSpPr>
+          <p:nvPr>
+            <p:ph type="body" idx="1"/>
+          </p:nvPr>
+        </p:nvSpPr>
+        <p:spPr/>
+        <p:txBody>
+          <a:bodyPr/>
+          <a:lstStyle/>
+          <a:p>
+            <a:endParaRPr lang="pt-BR" dirty="0"/>
+          </a:p>
+        </p:txBody>
+      </p:sp>
+      <p:sp>
+        <p:nvSpPr>
+          <p:cNvPr id="4" name="Espaço Reservado para Número de Slide 3"/>
+          <p:cNvSpPr>
+            <a:spLocks noGrp="1"/>
+          </p:cNvSpPr>
+          <p:nvPr>
+            <p:ph type="sldNum" sz="quarter" idx="10"/>
+          </p:nvPr>
+        </p:nvSpPr>
+        <p:spPr/>
+        <p:txBody>
+          <a:bodyPr/>
+          <a:lstStyle/>
+          <a:p>
+            <a:fld id="{463941E7-EB35-4884-B9D7-7CF822459A30}" type="slidenum">
+              <a:rPr lang="pt-BR" smtClean="0"/>
+              <a:t>23</a:t>
+            </a:fld>
+            <a:endParaRPr lang="pt-BR"/>
+          </a:p>
+        </p:txBody>
+      </p:sp>
+    </p:spTree>
+    <p:extLst>
+      <p:ext uri="{BB962C8B-B14F-4D97-AF65-F5344CB8AC3E}">
+        <p14:creationId xmlns:p14="http://schemas.microsoft.com/office/powerpoint/2010/main" val="3019117353"/>
+      </p:ext>
+    </p:extLst>
+  </p:cSld>
+  <p:clrMapOvr>
+    <a:masterClrMapping/>
+  </p:clrMapOvr>
+</p:notes>
+</file>
+
+<file path=ppt/notesSlides/notesSlide16.xml><?xml version="1.0" encoding="utf-8"?>
+<p:notes xmlns:a="http://schemas.openxmlformats.org/drawingml/2006/main" xmlns:r="http://schemas.openxmlformats.org/officeDocument/2006/relationships" xmlns:p="http://schemas.openxmlformats.org/presentationml/2006/main">
+  <p:cSld>
+    <p:spTree>
+      <p:nvGrpSpPr>
+        <p:cNvPr id="1" name=""/>
+        <p:cNvGrpSpPr/>
+        <p:nvPr/>
+      </p:nvGrpSpPr>
+      <p:grpSpPr>
+        <a:xfrm>
+          <a:off x="0" y="0"/>
+          <a:ext cx="0" cy="0"/>
+          <a:chOff x="0" y="0"/>
+          <a:chExt cx="0" cy="0"/>
+        </a:xfrm>
+      </p:grpSpPr>
+      <p:sp>
+        <p:nvSpPr>
+          <p:cNvPr id="2" name="Espaço Reservado para Imagem de Slide 1"/>
+          <p:cNvSpPr>
+            <a:spLocks noGrp="1" noRot="1" noChangeAspect="1"/>
+          </p:cNvSpPr>
+          <p:nvPr>
+            <p:ph type="sldImg"/>
+          </p:nvPr>
+        </p:nvSpPr>
+        <p:spPr/>
+      </p:sp>
+      <p:sp>
+        <p:nvSpPr>
+          <p:cNvPr id="3" name="Espaço Reservado para Anotações 2"/>
+          <p:cNvSpPr>
+            <a:spLocks noGrp="1"/>
+          </p:cNvSpPr>
+          <p:nvPr>
+            <p:ph type="body" idx="1"/>
+          </p:nvPr>
+        </p:nvSpPr>
+        <p:spPr/>
+        <p:txBody>
+          <a:bodyPr/>
+          <a:lstStyle/>
+          <a:p>
+            <a:endParaRPr lang="pt-BR" dirty="0"/>
+          </a:p>
+        </p:txBody>
+      </p:sp>
+      <p:sp>
+        <p:nvSpPr>
+          <p:cNvPr id="4" name="Espaço Reservado para Número de Slide 3"/>
+          <p:cNvSpPr>
+            <a:spLocks noGrp="1"/>
+          </p:cNvSpPr>
+          <p:nvPr>
+            <p:ph type="sldNum" sz="quarter" idx="10"/>
+          </p:nvPr>
+        </p:nvSpPr>
+        <p:spPr/>
+        <p:txBody>
+          <a:bodyPr/>
+          <a:lstStyle/>
+          <a:p>
+            <a:fld id="{463941E7-EB35-4884-B9D7-7CF822459A30}" type="slidenum">
+              <a:rPr lang="pt-BR" smtClean="0"/>
+              <a:t>25</a:t>
+            </a:fld>
+            <a:endParaRPr lang="pt-BR"/>
+          </a:p>
+        </p:txBody>
+      </p:sp>
+    </p:spTree>
+    <p:extLst>
+      <p:ext uri="{BB962C8B-B14F-4D97-AF65-F5344CB8AC3E}">
+        <p14:creationId xmlns:p14="http://schemas.microsoft.com/office/powerpoint/2010/main" val="1143299033"/>
+      </p:ext>
+    </p:extLst>
+  </p:cSld>
+  <p:clrMapOvr>
+    <a:masterClrMapping/>
+  </p:clrMapOvr>
+</p:notes>
+</file>
+
+<file path=ppt/notesSlides/notesSlide17.xml><?xml version="1.0" encoding="utf-8"?>
+<p:notes xmlns:a="http://schemas.openxmlformats.org/drawingml/2006/main" xmlns:r="http://schemas.openxmlformats.org/officeDocument/2006/relationships" xmlns:p="http://schemas.openxmlformats.org/presentationml/2006/main">
+  <p:cSld>
+    <p:spTree>
+      <p:nvGrpSpPr>
+        <p:cNvPr id="1" name=""/>
+        <p:cNvGrpSpPr/>
+        <p:nvPr/>
+      </p:nvGrpSpPr>
+      <p:grpSpPr>
+        <a:xfrm>
+          <a:off x="0" y="0"/>
+          <a:ext cx="0" cy="0"/>
+          <a:chOff x="0" y="0"/>
+          <a:chExt cx="0" cy="0"/>
+        </a:xfrm>
+      </p:grpSpPr>
+      <p:sp>
+        <p:nvSpPr>
+          <p:cNvPr id="2" name="Espaço Reservado para Imagem de Slide 1"/>
+          <p:cNvSpPr>
+            <a:spLocks noGrp="1" noRot="1" noChangeAspect="1"/>
+          </p:cNvSpPr>
+          <p:nvPr>
+            <p:ph type="sldImg"/>
+          </p:nvPr>
+        </p:nvSpPr>
+        <p:spPr/>
+      </p:sp>
+      <p:sp>
+        <p:nvSpPr>
+          <p:cNvPr id="3" name="Espaço Reservado para Anotações 2"/>
+          <p:cNvSpPr>
+            <a:spLocks noGrp="1"/>
+          </p:cNvSpPr>
+          <p:nvPr>
+            <p:ph type="body" idx="1"/>
+          </p:nvPr>
+        </p:nvSpPr>
+        <p:spPr/>
+        <p:txBody>
+          <a:bodyPr/>
+          <a:lstStyle/>
+          <a:p>
+            <a:endParaRPr lang="pt-BR" dirty="0"/>
+          </a:p>
+        </p:txBody>
+      </p:sp>
+      <p:sp>
+        <p:nvSpPr>
+          <p:cNvPr id="4" name="Espaço Reservado para Número de Slide 3"/>
+          <p:cNvSpPr>
+            <a:spLocks noGrp="1"/>
+          </p:cNvSpPr>
+          <p:nvPr>
+            <p:ph type="sldNum" sz="quarter" idx="10"/>
+          </p:nvPr>
+        </p:nvSpPr>
+        <p:spPr/>
+        <p:txBody>
+          <a:bodyPr/>
+          <a:lstStyle/>
+          <a:p>
+            <a:fld id="{463941E7-EB35-4884-B9D7-7CF822459A30}" type="slidenum">
+              <a:rPr lang="pt-BR" smtClean="0"/>
+              <a:t>26</a:t>
+            </a:fld>
+            <a:endParaRPr lang="pt-BR"/>
+          </a:p>
+        </p:txBody>
+      </p:sp>
+    </p:spTree>
+    <p:extLst>
+      <p:ext uri="{BB962C8B-B14F-4D97-AF65-F5344CB8AC3E}">
+        <p14:creationId xmlns:p14="http://schemas.microsoft.com/office/powerpoint/2010/main" val="1478315106"/>
       </p:ext>
     </p:extLst>
   </p:cSld>
@@ -631,7 +1316,7 @@
           <a:p>
             <a:fld id="{463941E7-EB35-4884-B9D7-7CF822459A30}" type="slidenum">
               <a:rPr lang="pt-BR" smtClean="0"/>
-              <a:t>10</a:t>
+              <a:t>7</a:t>
             </a:fld>
             <a:endParaRPr lang="pt-BR"/>
           </a:p>
@@ -640,7 +1325,7 @@
     </p:spTree>
     <p:extLst>
       <p:ext uri="{BB962C8B-B14F-4D97-AF65-F5344CB8AC3E}">
-        <p14:creationId xmlns:p14="http://schemas.microsoft.com/office/powerpoint/2010/main" val="3019117353"/>
+        <p14:creationId xmlns:p14="http://schemas.microsoft.com/office/powerpoint/2010/main" val="2046693402"/>
       </p:ext>
     </p:extLst>
   </p:cSld>
@@ -715,7 +1400,7 @@
           <a:p>
             <a:fld id="{463941E7-EB35-4884-B9D7-7CF822459A30}" type="slidenum">
               <a:rPr lang="pt-BR" smtClean="0"/>
-              <a:t>12</a:t>
+              <a:t>8</a:t>
             </a:fld>
             <a:endParaRPr lang="pt-BR"/>
           </a:p>
@@ -724,7 +1409,7 @@
     </p:spTree>
     <p:extLst>
       <p:ext uri="{BB962C8B-B14F-4D97-AF65-F5344CB8AC3E}">
-        <p14:creationId xmlns:p14="http://schemas.microsoft.com/office/powerpoint/2010/main" val="1143299033"/>
+        <p14:creationId xmlns:p14="http://schemas.microsoft.com/office/powerpoint/2010/main" val="3966872292"/>
       </p:ext>
     </p:extLst>
   </p:cSld>
@@ -799,6 +1484,342 @@
           <a:p>
             <a:fld id="{463941E7-EB35-4884-B9D7-7CF822459A30}" type="slidenum">
               <a:rPr lang="pt-BR" smtClean="0"/>
+              <a:t>9</a:t>
+            </a:fld>
+            <a:endParaRPr lang="pt-BR"/>
+          </a:p>
+        </p:txBody>
+      </p:sp>
+    </p:spTree>
+    <p:extLst>
+      <p:ext uri="{BB962C8B-B14F-4D97-AF65-F5344CB8AC3E}">
+        <p14:creationId xmlns:p14="http://schemas.microsoft.com/office/powerpoint/2010/main" val="785986322"/>
+      </p:ext>
+    </p:extLst>
+  </p:cSld>
+  <p:clrMapOvr>
+    <a:masterClrMapping/>
+  </p:clrMapOvr>
+</p:notes>
+</file>
+
+<file path=ppt/notesSlides/notesSlide5.xml><?xml version="1.0" encoding="utf-8"?>
+<p:notes xmlns:a="http://schemas.openxmlformats.org/drawingml/2006/main" xmlns:r="http://schemas.openxmlformats.org/officeDocument/2006/relationships" xmlns:p="http://schemas.openxmlformats.org/presentationml/2006/main">
+  <p:cSld>
+    <p:spTree>
+      <p:nvGrpSpPr>
+        <p:cNvPr id="1" name=""/>
+        <p:cNvGrpSpPr/>
+        <p:nvPr/>
+      </p:nvGrpSpPr>
+      <p:grpSpPr>
+        <a:xfrm>
+          <a:off x="0" y="0"/>
+          <a:ext cx="0" cy="0"/>
+          <a:chOff x="0" y="0"/>
+          <a:chExt cx="0" cy="0"/>
+        </a:xfrm>
+      </p:grpSpPr>
+      <p:sp>
+        <p:nvSpPr>
+          <p:cNvPr id="2" name="Espaço Reservado para Imagem de Slide 1"/>
+          <p:cNvSpPr>
+            <a:spLocks noGrp="1" noRot="1" noChangeAspect="1"/>
+          </p:cNvSpPr>
+          <p:nvPr>
+            <p:ph type="sldImg"/>
+          </p:nvPr>
+        </p:nvSpPr>
+        <p:spPr/>
+      </p:sp>
+      <p:sp>
+        <p:nvSpPr>
+          <p:cNvPr id="3" name="Espaço Reservado para Anotações 2"/>
+          <p:cNvSpPr>
+            <a:spLocks noGrp="1"/>
+          </p:cNvSpPr>
+          <p:nvPr>
+            <p:ph type="body" idx="1"/>
+          </p:nvPr>
+        </p:nvSpPr>
+        <p:spPr/>
+        <p:txBody>
+          <a:bodyPr/>
+          <a:lstStyle/>
+          <a:p>
+            <a:endParaRPr lang="pt-BR" dirty="0"/>
+          </a:p>
+        </p:txBody>
+      </p:sp>
+      <p:sp>
+        <p:nvSpPr>
+          <p:cNvPr id="4" name="Espaço Reservado para Número de Slide 3"/>
+          <p:cNvSpPr>
+            <a:spLocks noGrp="1"/>
+          </p:cNvSpPr>
+          <p:nvPr>
+            <p:ph type="sldNum" sz="quarter" idx="10"/>
+          </p:nvPr>
+        </p:nvSpPr>
+        <p:spPr/>
+        <p:txBody>
+          <a:bodyPr/>
+          <a:lstStyle/>
+          <a:p>
+            <a:fld id="{463941E7-EB35-4884-B9D7-7CF822459A30}" type="slidenum">
+              <a:rPr lang="pt-BR" smtClean="0"/>
+              <a:t>10</a:t>
+            </a:fld>
+            <a:endParaRPr lang="pt-BR"/>
+          </a:p>
+        </p:txBody>
+      </p:sp>
+    </p:spTree>
+    <p:extLst>
+      <p:ext uri="{BB962C8B-B14F-4D97-AF65-F5344CB8AC3E}">
+        <p14:creationId xmlns:p14="http://schemas.microsoft.com/office/powerpoint/2010/main" val="2445385559"/>
+      </p:ext>
+    </p:extLst>
+  </p:cSld>
+  <p:clrMapOvr>
+    <a:masterClrMapping/>
+  </p:clrMapOvr>
+</p:notes>
+</file>
+
+<file path=ppt/notesSlides/notesSlide6.xml><?xml version="1.0" encoding="utf-8"?>
+<p:notes xmlns:a="http://schemas.openxmlformats.org/drawingml/2006/main" xmlns:r="http://schemas.openxmlformats.org/officeDocument/2006/relationships" xmlns:p="http://schemas.openxmlformats.org/presentationml/2006/main">
+  <p:cSld>
+    <p:spTree>
+      <p:nvGrpSpPr>
+        <p:cNvPr id="1" name=""/>
+        <p:cNvGrpSpPr/>
+        <p:nvPr/>
+      </p:nvGrpSpPr>
+      <p:grpSpPr>
+        <a:xfrm>
+          <a:off x="0" y="0"/>
+          <a:ext cx="0" cy="0"/>
+          <a:chOff x="0" y="0"/>
+          <a:chExt cx="0" cy="0"/>
+        </a:xfrm>
+      </p:grpSpPr>
+      <p:sp>
+        <p:nvSpPr>
+          <p:cNvPr id="2" name="Espaço Reservado para Imagem de Slide 1"/>
+          <p:cNvSpPr>
+            <a:spLocks noGrp="1" noRot="1" noChangeAspect="1"/>
+          </p:cNvSpPr>
+          <p:nvPr>
+            <p:ph type="sldImg"/>
+          </p:nvPr>
+        </p:nvSpPr>
+        <p:spPr/>
+      </p:sp>
+      <p:sp>
+        <p:nvSpPr>
+          <p:cNvPr id="3" name="Espaço Reservado para Anotações 2"/>
+          <p:cNvSpPr>
+            <a:spLocks noGrp="1"/>
+          </p:cNvSpPr>
+          <p:nvPr>
+            <p:ph type="body" idx="1"/>
+          </p:nvPr>
+        </p:nvSpPr>
+        <p:spPr/>
+        <p:txBody>
+          <a:bodyPr/>
+          <a:lstStyle/>
+          <a:p>
+            <a:endParaRPr lang="pt-BR" dirty="0"/>
+          </a:p>
+        </p:txBody>
+      </p:sp>
+      <p:sp>
+        <p:nvSpPr>
+          <p:cNvPr id="4" name="Espaço Reservado para Número de Slide 3"/>
+          <p:cNvSpPr>
+            <a:spLocks noGrp="1"/>
+          </p:cNvSpPr>
+          <p:nvPr>
+            <p:ph type="sldNum" sz="quarter" idx="10"/>
+          </p:nvPr>
+        </p:nvSpPr>
+        <p:spPr/>
+        <p:txBody>
+          <a:bodyPr/>
+          <a:lstStyle/>
+          <a:p>
+            <a:fld id="{463941E7-EB35-4884-B9D7-7CF822459A30}" type="slidenum">
+              <a:rPr lang="pt-BR" smtClean="0"/>
+              <a:t>11</a:t>
+            </a:fld>
+            <a:endParaRPr lang="pt-BR"/>
+          </a:p>
+        </p:txBody>
+      </p:sp>
+    </p:spTree>
+    <p:extLst>
+      <p:ext uri="{BB962C8B-B14F-4D97-AF65-F5344CB8AC3E}">
+        <p14:creationId xmlns:p14="http://schemas.microsoft.com/office/powerpoint/2010/main" val="3231568235"/>
+      </p:ext>
+    </p:extLst>
+  </p:cSld>
+  <p:clrMapOvr>
+    <a:masterClrMapping/>
+  </p:clrMapOvr>
+</p:notes>
+</file>
+
+<file path=ppt/notesSlides/notesSlide7.xml><?xml version="1.0" encoding="utf-8"?>
+<p:notes xmlns:a="http://schemas.openxmlformats.org/drawingml/2006/main" xmlns:r="http://schemas.openxmlformats.org/officeDocument/2006/relationships" xmlns:p="http://schemas.openxmlformats.org/presentationml/2006/main">
+  <p:cSld>
+    <p:spTree>
+      <p:nvGrpSpPr>
+        <p:cNvPr id="1" name=""/>
+        <p:cNvGrpSpPr/>
+        <p:nvPr/>
+      </p:nvGrpSpPr>
+      <p:grpSpPr>
+        <a:xfrm>
+          <a:off x="0" y="0"/>
+          <a:ext cx="0" cy="0"/>
+          <a:chOff x="0" y="0"/>
+          <a:chExt cx="0" cy="0"/>
+        </a:xfrm>
+      </p:grpSpPr>
+      <p:sp>
+        <p:nvSpPr>
+          <p:cNvPr id="2" name="Espaço Reservado para Imagem de Slide 1"/>
+          <p:cNvSpPr>
+            <a:spLocks noGrp="1" noRot="1" noChangeAspect="1"/>
+          </p:cNvSpPr>
+          <p:nvPr>
+            <p:ph type="sldImg"/>
+          </p:nvPr>
+        </p:nvSpPr>
+        <p:spPr/>
+      </p:sp>
+      <p:sp>
+        <p:nvSpPr>
+          <p:cNvPr id="3" name="Espaço Reservado para Anotações 2"/>
+          <p:cNvSpPr>
+            <a:spLocks noGrp="1"/>
+          </p:cNvSpPr>
+          <p:nvPr>
+            <p:ph type="body" idx="1"/>
+          </p:nvPr>
+        </p:nvSpPr>
+        <p:spPr/>
+        <p:txBody>
+          <a:bodyPr/>
+          <a:lstStyle/>
+          <a:p>
+            <a:endParaRPr lang="pt-BR" dirty="0"/>
+          </a:p>
+        </p:txBody>
+      </p:sp>
+      <p:sp>
+        <p:nvSpPr>
+          <p:cNvPr id="4" name="Espaço Reservado para Número de Slide 3"/>
+          <p:cNvSpPr>
+            <a:spLocks noGrp="1"/>
+          </p:cNvSpPr>
+          <p:nvPr>
+            <p:ph type="sldNum" sz="quarter" idx="10"/>
+          </p:nvPr>
+        </p:nvSpPr>
+        <p:spPr/>
+        <p:txBody>
+          <a:bodyPr/>
+          <a:lstStyle/>
+          <a:p>
+            <a:fld id="{463941E7-EB35-4884-B9D7-7CF822459A30}" type="slidenum">
+              <a:rPr lang="pt-BR" smtClean="0"/>
+              <a:t>12</a:t>
+            </a:fld>
+            <a:endParaRPr lang="pt-BR"/>
+          </a:p>
+        </p:txBody>
+      </p:sp>
+    </p:spTree>
+    <p:extLst>
+      <p:ext uri="{BB962C8B-B14F-4D97-AF65-F5344CB8AC3E}">
+        <p14:creationId xmlns:p14="http://schemas.microsoft.com/office/powerpoint/2010/main" val="503574914"/>
+      </p:ext>
+    </p:extLst>
+  </p:cSld>
+  <p:clrMapOvr>
+    <a:masterClrMapping/>
+  </p:clrMapOvr>
+</p:notes>
+</file>
+
+<file path=ppt/notesSlides/notesSlide8.xml><?xml version="1.0" encoding="utf-8"?>
+<p:notes xmlns:a="http://schemas.openxmlformats.org/drawingml/2006/main" xmlns:r="http://schemas.openxmlformats.org/officeDocument/2006/relationships" xmlns:p="http://schemas.openxmlformats.org/presentationml/2006/main">
+  <p:cSld>
+    <p:spTree>
+      <p:nvGrpSpPr>
+        <p:cNvPr id="1" name=""/>
+        <p:cNvGrpSpPr/>
+        <p:nvPr/>
+      </p:nvGrpSpPr>
+      <p:grpSpPr>
+        <a:xfrm>
+          <a:off x="0" y="0"/>
+          <a:ext cx="0" cy="0"/>
+          <a:chOff x="0" y="0"/>
+          <a:chExt cx="0" cy="0"/>
+        </a:xfrm>
+      </p:grpSpPr>
+      <p:sp>
+        <p:nvSpPr>
+          <p:cNvPr id="2" name="Espaço Reservado para Imagem de Slide 1"/>
+          <p:cNvSpPr>
+            <a:spLocks noGrp="1" noRot="1" noChangeAspect="1"/>
+          </p:cNvSpPr>
+          <p:nvPr>
+            <p:ph type="sldImg"/>
+          </p:nvPr>
+        </p:nvSpPr>
+        <p:spPr/>
+      </p:sp>
+      <p:sp>
+        <p:nvSpPr>
+          <p:cNvPr id="3" name="Espaço Reservado para Anotações 2"/>
+          <p:cNvSpPr>
+            <a:spLocks noGrp="1"/>
+          </p:cNvSpPr>
+          <p:nvPr>
+            <p:ph type="body" idx="1"/>
+          </p:nvPr>
+        </p:nvSpPr>
+        <p:spPr/>
+        <p:txBody>
+          <a:bodyPr/>
+          <a:lstStyle/>
+          <a:p>
+            <a:endParaRPr lang="pt-BR" dirty="0"/>
+          </a:p>
+        </p:txBody>
+      </p:sp>
+      <p:sp>
+        <p:nvSpPr>
+          <p:cNvPr id="4" name="Espaço Reservado para Número de Slide 3"/>
+          <p:cNvSpPr>
+            <a:spLocks noGrp="1"/>
+          </p:cNvSpPr>
+          <p:nvPr>
+            <p:ph type="sldNum" sz="quarter" idx="10"/>
+          </p:nvPr>
+        </p:nvSpPr>
+        <p:spPr/>
+        <p:txBody>
+          <a:bodyPr/>
+          <a:lstStyle/>
+          <a:p>
+            <a:fld id="{463941E7-EB35-4884-B9D7-7CF822459A30}" type="slidenum">
+              <a:rPr lang="pt-BR" smtClean="0"/>
               <a:t>13</a:t>
             </a:fld>
             <a:endParaRPr lang="pt-BR"/>
@@ -808,7 +1829,91 @@
     </p:spTree>
     <p:extLst>
       <p:ext uri="{BB962C8B-B14F-4D97-AF65-F5344CB8AC3E}">
-        <p14:creationId xmlns:p14="http://schemas.microsoft.com/office/powerpoint/2010/main" val="1478315106"/>
+        <p14:creationId xmlns:p14="http://schemas.microsoft.com/office/powerpoint/2010/main" val="2784043417"/>
+      </p:ext>
+    </p:extLst>
+  </p:cSld>
+  <p:clrMapOvr>
+    <a:masterClrMapping/>
+  </p:clrMapOvr>
+</p:notes>
+</file>
+
+<file path=ppt/notesSlides/notesSlide9.xml><?xml version="1.0" encoding="utf-8"?>
+<p:notes xmlns:a="http://schemas.openxmlformats.org/drawingml/2006/main" xmlns:r="http://schemas.openxmlformats.org/officeDocument/2006/relationships" xmlns:p="http://schemas.openxmlformats.org/presentationml/2006/main">
+  <p:cSld>
+    <p:spTree>
+      <p:nvGrpSpPr>
+        <p:cNvPr id="1" name=""/>
+        <p:cNvGrpSpPr/>
+        <p:nvPr/>
+      </p:nvGrpSpPr>
+      <p:grpSpPr>
+        <a:xfrm>
+          <a:off x="0" y="0"/>
+          <a:ext cx="0" cy="0"/>
+          <a:chOff x="0" y="0"/>
+          <a:chExt cx="0" cy="0"/>
+        </a:xfrm>
+      </p:grpSpPr>
+      <p:sp>
+        <p:nvSpPr>
+          <p:cNvPr id="2" name="Espaço Reservado para Imagem de Slide 1"/>
+          <p:cNvSpPr>
+            <a:spLocks noGrp="1" noRot="1" noChangeAspect="1"/>
+          </p:cNvSpPr>
+          <p:nvPr>
+            <p:ph type="sldImg"/>
+          </p:nvPr>
+        </p:nvSpPr>
+        <p:spPr/>
+      </p:sp>
+      <p:sp>
+        <p:nvSpPr>
+          <p:cNvPr id="3" name="Espaço Reservado para Anotações 2"/>
+          <p:cNvSpPr>
+            <a:spLocks noGrp="1"/>
+          </p:cNvSpPr>
+          <p:nvPr>
+            <p:ph type="body" idx="1"/>
+          </p:nvPr>
+        </p:nvSpPr>
+        <p:spPr/>
+        <p:txBody>
+          <a:bodyPr/>
+          <a:lstStyle/>
+          <a:p>
+            <a:endParaRPr lang="pt-BR" dirty="0"/>
+          </a:p>
+        </p:txBody>
+      </p:sp>
+      <p:sp>
+        <p:nvSpPr>
+          <p:cNvPr id="4" name="Espaço Reservado para Número de Slide 3"/>
+          <p:cNvSpPr>
+            <a:spLocks noGrp="1"/>
+          </p:cNvSpPr>
+          <p:nvPr>
+            <p:ph type="sldNum" sz="quarter" idx="10"/>
+          </p:nvPr>
+        </p:nvSpPr>
+        <p:spPr/>
+        <p:txBody>
+          <a:bodyPr/>
+          <a:lstStyle/>
+          <a:p>
+            <a:fld id="{463941E7-EB35-4884-B9D7-7CF822459A30}" type="slidenum">
+              <a:rPr lang="pt-BR" smtClean="0"/>
+              <a:t>14</a:t>
+            </a:fld>
+            <a:endParaRPr lang="pt-BR"/>
+          </a:p>
+        </p:txBody>
+      </p:sp>
+    </p:spTree>
+    <p:extLst>
+      <p:ext uri="{BB962C8B-B14F-4D97-AF65-F5344CB8AC3E}">
+        <p14:creationId xmlns:p14="http://schemas.microsoft.com/office/powerpoint/2010/main" val="2125570466"/>
       </p:ext>
     </p:extLst>
   </p:cSld>
@@ -949,7 +2054,7 @@
           <a:p>
             <a:fld id="{B25FA02D-CFD2-435F-BAF7-6A96BBD8F4D9}" type="datetimeFigureOut">
               <a:rPr lang="pt-BR" smtClean="0"/>
-              <a:t>06/10/2019</a:t>
+              <a:t>13/10/2019</a:t>
             </a:fld>
             <a:endParaRPr lang="pt-BR"/>
           </a:p>
@@ -1119,7 +2224,7 @@
           <a:p>
             <a:fld id="{B25FA02D-CFD2-435F-BAF7-6A96BBD8F4D9}" type="datetimeFigureOut">
               <a:rPr lang="pt-BR" smtClean="0"/>
-              <a:t>06/10/2019</a:t>
+              <a:t>13/10/2019</a:t>
             </a:fld>
             <a:endParaRPr lang="pt-BR"/>
           </a:p>
@@ -1299,7 +2404,7 @@
           <a:p>
             <a:fld id="{B25FA02D-CFD2-435F-BAF7-6A96BBD8F4D9}" type="datetimeFigureOut">
               <a:rPr lang="pt-BR" smtClean="0"/>
-              <a:t>06/10/2019</a:t>
+              <a:t>13/10/2019</a:t>
             </a:fld>
             <a:endParaRPr lang="pt-BR"/>
           </a:p>
@@ -1502,7 +2607,7 @@
           <a:p>
             <a:fld id="{B25FA02D-CFD2-435F-BAF7-6A96BBD8F4D9}" type="datetimeFigureOut">
               <a:rPr lang="pt-BR" smtClean="0"/>
-              <a:t>06/10/2019</a:t>
+              <a:t>13/10/2019</a:t>
             </a:fld>
             <a:endParaRPr lang="pt-BR"/>
           </a:p>
@@ -1833,7 +2938,7 @@
           <a:p>
             <a:fld id="{B25FA02D-CFD2-435F-BAF7-6A96BBD8F4D9}" type="datetimeFigureOut">
               <a:rPr lang="pt-BR" smtClean="0"/>
-              <a:t>06/10/2019</a:t>
+              <a:t>13/10/2019</a:t>
             </a:fld>
             <a:endParaRPr lang="pt-BR"/>
           </a:p>
@@ -2065,7 +3170,7 @@
           <a:p>
             <a:fld id="{B25FA02D-CFD2-435F-BAF7-6A96BBD8F4D9}" type="datetimeFigureOut">
               <a:rPr lang="pt-BR" smtClean="0"/>
-              <a:t>06/10/2019</a:t>
+              <a:t>13/10/2019</a:t>
             </a:fld>
             <a:endParaRPr lang="pt-BR"/>
           </a:p>
@@ -2432,7 +3537,7 @@
           <a:p>
             <a:fld id="{B25FA02D-CFD2-435F-BAF7-6A96BBD8F4D9}" type="datetimeFigureOut">
               <a:rPr lang="pt-BR" smtClean="0"/>
-              <a:t>06/10/2019</a:t>
+              <a:t>13/10/2019</a:t>
             </a:fld>
             <a:endParaRPr lang="pt-BR"/>
           </a:p>
@@ -2550,7 +3655,7 @@
           <a:p>
             <a:fld id="{B25FA02D-CFD2-435F-BAF7-6A96BBD8F4D9}" type="datetimeFigureOut">
               <a:rPr lang="pt-BR" smtClean="0"/>
-              <a:t>06/10/2019</a:t>
+              <a:t>13/10/2019</a:t>
             </a:fld>
             <a:endParaRPr lang="pt-BR"/>
           </a:p>
@@ -2645,7 +3750,7 @@
           <a:p>
             <a:fld id="{B25FA02D-CFD2-435F-BAF7-6A96BBD8F4D9}" type="datetimeFigureOut">
               <a:rPr lang="pt-BR" smtClean="0"/>
-              <a:t>06/10/2019</a:t>
+              <a:t>13/10/2019</a:t>
             </a:fld>
             <a:endParaRPr lang="pt-BR"/>
           </a:p>
@@ -2922,7 +4027,7 @@
           <a:p>
             <a:fld id="{B25FA02D-CFD2-435F-BAF7-6A96BBD8F4D9}" type="datetimeFigureOut">
               <a:rPr lang="pt-BR" smtClean="0"/>
-              <a:t>06/10/2019</a:t>
+              <a:t>13/10/2019</a:t>
             </a:fld>
             <a:endParaRPr lang="pt-BR"/>
           </a:p>
@@ -3179,7 +4284,7 @@
           <a:p>
             <a:fld id="{B25FA02D-CFD2-435F-BAF7-6A96BBD8F4D9}" type="datetimeFigureOut">
               <a:rPr lang="pt-BR" smtClean="0"/>
-              <a:t>06/10/2019</a:t>
+              <a:t>13/10/2019</a:t>
             </a:fld>
             <a:endParaRPr lang="pt-BR"/>
           </a:p>
@@ -3392,7 +4497,7 @@
           <a:p>
             <a:fld id="{B25FA02D-CFD2-435F-BAF7-6A96BBD8F4D9}" type="datetimeFigureOut">
               <a:rPr lang="pt-BR" smtClean="0"/>
-              <a:t>06/10/2019</a:t>
+              <a:t>13/10/2019</a:t>
             </a:fld>
             <a:endParaRPr lang="pt-BR"/>
           </a:p>
@@ -3914,7 +5019,7 @@
                   <a:schemeClr val="bg1"/>
                 </a:solidFill>
               </a:rPr>
-              <a:t>Outilier</a:t>
+              <a:t>Outlier</a:t>
             </a:r>
             <a:r>
               <a:rPr lang="pt-BR" sz="4400" dirty="0" smtClean="0">
@@ -3994,7 +5099,29 @@
                   </a:schemeClr>
                 </a:solidFill>
               </a:rPr>
-              <a:t>00 de outubro de 2019 </a:t>
+              <a:t>17</a:t>
+            </a:r>
+            <a:r>
+              <a:rPr lang="pt-BR" sz="1700" dirty="0" smtClean="0">
+                <a:solidFill>
+                  <a:schemeClr val="tx1">
+                    <a:lumMod val="85000"/>
+                    <a:lumOff val="15000"/>
+                  </a:schemeClr>
+                </a:solidFill>
+              </a:rPr>
+              <a:t> </a:t>
+            </a:r>
+            <a:r>
+              <a:rPr lang="pt-BR" sz="1700" dirty="0" smtClean="0">
+                <a:solidFill>
+                  <a:schemeClr val="tx1">
+                    <a:lumMod val="85000"/>
+                    <a:lumOff val="15000"/>
+                  </a:schemeClr>
+                </a:solidFill>
+              </a:rPr>
+              <a:t>de outubro de 2019 </a:t>
             </a:r>
             <a:endParaRPr lang="pt-BR" sz="1700" dirty="0">
               <a:solidFill>
@@ -4101,6 +5228,1600 @@
           <a:lstStyle/>
           <a:p>
             <a:r>
+              <a:rPr lang="pt-BR" dirty="0"/>
+              <a:t>Fase 2: Seleção TOS</a:t>
+            </a:r>
+            <a:endParaRPr lang="pt-BR" dirty="0"/>
+          </a:p>
+        </p:txBody>
+      </p:sp>
+      <p:sp>
+        <p:nvSpPr>
+          <p:cNvPr id="2" name="CaixaDeTexto 1"/>
+          <p:cNvSpPr txBox="1"/>
+          <p:nvPr/>
+        </p:nvSpPr>
+        <p:spPr>
+          <a:xfrm>
+            <a:off x="823784" y="2207741"/>
+            <a:ext cx="5066270" cy="369332"/>
+          </a:xfrm>
+          <a:prstGeom prst="rect">
+            <a:avLst/>
+          </a:prstGeom>
+          <a:noFill/>
+        </p:spPr>
+        <p:txBody>
+          <a:bodyPr wrap="square" rtlCol="0">
+            <a:spAutoFit/>
+          </a:bodyPr>
+          <a:lstStyle/>
+          <a:p>
+            <a:r>
+              <a:rPr lang="pt-BR" dirty="0" smtClean="0"/>
+              <a:t>No trabalho de </a:t>
+            </a:r>
+            <a:r>
+              <a:rPr lang="pt-BR" dirty="0" err="1" smtClean="0"/>
+              <a:t>Micenková</a:t>
+            </a:r>
+            <a:r>
+              <a:rPr lang="pt-BR" dirty="0" smtClean="0"/>
+              <a:t>: </a:t>
+            </a:r>
+            <a:endParaRPr lang="pt-BR" dirty="0"/>
+          </a:p>
+        </p:txBody>
+      </p:sp>
+      <p:pic>
+        <p:nvPicPr>
+          <p:cNvPr id="4" name="Imagem 3"/>
+          <p:cNvPicPr>
+            <a:picLocks noChangeAspect="1"/>
+          </p:cNvPicPr>
+          <p:nvPr/>
+        </p:nvPicPr>
+        <p:blipFill>
+          <a:blip r:embed="rId3">
+            <a:extLst>
+              <a:ext uri="{28A0092B-C50C-407E-A947-70E740481C1C}">
+                <a14:useLocalDpi xmlns:a14="http://schemas.microsoft.com/office/drawing/2010/main" val="0"/>
+              </a:ext>
+            </a:extLst>
+          </a:blip>
+          <a:stretch>
+            <a:fillRect/>
+          </a:stretch>
+        </p:blipFill>
+        <p:spPr>
+          <a:xfrm>
+            <a:off x="3910881" y="2207741"/>
+            <a:ext cx="3746891" cy="460306"/>
+          </a:xfrm>
+          <a:prstGeom prst="rect">
+            <a:avLst/>
+          </a:prstGeom>
+        </p:spPr>
+      </p:pic>
+      <p:pic>
+        <p:nvPicPr>
+          <p:cNvPr id="5" name="Imagem 4"/>
+          <p:cNvPicPr>
+            <a:picLocks noChangeAspect="1"/>
+          </p:cNvPicPr>
+          <p:nvPr/>
+        </p:nvPicPr>
+        <p:blipFill>
+          <a:blip r:embed="rId4">
+            <a:extLst>
+              <a:ext uri="{28A0092B-C50C-407E-A947-70E740481C1C}">
+                <a14:useLocalDpi xmlns:a14="http://schemas.microsoft.com/office/drawing/2010/main" val="0"/>
+              </a:ext>
+            </a:extLst>
+          </a:blip>
+          <a:stretch>
+            <a:fillRect/>
+          </a:stretch>
+        </p:blipFill>
+        <p:spPr>
+          <a:xfrm>
+            <a:off x="7623733" y="2704110"/>
+            <a:ext cx="891617" cy="297206"/>
+          </a:xfrm>
+          <a:prstGeom prst="rect">
+            <a:avLst/>
+          </a:prstGeom>
+        </p:spPr>
+      </p:pic>
+      <p:sp>
+        <p:nvSpPr>
+          <p:cNvPr id="6" name="CaixaDeTexto 5"/>
+          <p:cNvSpPr txBox="1"/>
+          <p:nvPr/>
+        </p:nvSpPr>
+        <p:spPr>
+          <a:xfrm>
+            <a:off x="6895385" y="2668047"/>
+            <a:ext cx="873211" cy="369332"/>
+          </a:xfrm>
+          <a:prstGeom prst="rect">
+            <a:avLst/>
+          </a:prstGeom>
+          <a:noFill/>
+        </p:spPr>
+        <p:txBody>
+          <a:bodyPr wrap="square" rtlCol="0">
+            <a:spAutoFit/>
+          </a:bodyPr>
+          <a:lstStyle/>
+          <a:p>
+            <a:r>
+              <a:rPr lang="pt-BR" dirty="0" smtClean="0"/>
+              <a:t>onde</a:t>
+            </a:r>
+            <a:endParaRPr lang="pt-BR" dirty="0"/>
+          </a:p>
+        </p:txBody>
+      </p:sp>
+      <p:sp>
+        <p:nvSpPr>
+          <p:cNvPr id="7" name="CaixaDeTexto 6"/>
+          <p:cNvSpPr txBox="1"/>
+          <p:nvPr/>
+        </p:nvSpPr>
+        <p:spPr>
+          <a:xfrm>
+            <a:off x="823784" y="3369903"/>
+            <a:ext cx="7867135" cy="369332"/>
+          </a:xfrm>
+          <a:prstGeom prst="rect">
+            <a:avLst/>
+          </a:prstGeom>
+          <a:noFill/>
+        </p:spPr>
+        <p:txBody>
+          <a:bodyPr wrap="square" rtlCol="0">
+            <a:spAutoFit/>
+          </a:bodyPr>
+          <a:lstStyle/>
+          <a:p>
+            <a:r>
+              <a:rPr lang="pt-BR" dirty="0" smtClean="0"/>
+              <a:t>Neste trabalho, selecionou-se apenas                              de             pois:  </a:t>
+            </a:r>
+            <a:endParaRPr lang="pt-BR" dirty="0"/>
+          </a:p>
+        </p:txBody>
+      </p:sp>
+      <p:pic>
+        <p:nvPicPr>
+          <p:cNvPr id="8" name="Imagem 7"/>
+          <p:cNvPicPr>
+            <a:picLocks noChangeAspect="1"/>
+          </p:cNvPicPr>
+          <p:nvPr/>
+        </p:nvPicPr>
+        <p:blipFill>
+          <a:blip r:embed="rId5">
+            <a:extLst>
+              <a:ext uri="{28A0092B-C50C-407E-A947-70E740481C1C}">
+                <a14:useLocalDpi xmlns:a14="http://schemas.microsoft.com/office/drawing/2010/main" val="0"/>
+              </a:ext>
+            </a:extLst>
+          </a:blip>
+          <a:stretch>
+            <a:fillRect/>
+          </a:stretch>
+        </p:blipFill>
+        <p:spPr>
+          <a:xfrm>
+            <a:off x="4541197" y="3449650"/>
+            <a:ext cx="1348857" cy="289585"/>
+          </a:xfrm>
+          <a:prstGeom prst="rect">
+            <a:avLst/>
+          </a:prstGeom>
+        </p:spPr>
+      </p:pic>
+      <p:pic>
+        <p:nvPicPr>
+          <p:cNvPr id="9" name="Imagem 8"/>
+          <p:cNvPicPr>
+            <a:picLocks noChangeAspect="1"/>
+          </p:cNvPicPr>
+          <p:nvPr/>
+        </p:nvPicPr>
+        <p:blipFill>
+          <a:blip r:embed="rId6">
+            <a:extLst>
+              <a:ext uri="{28A0092B-C50C-407E-A947-70E740481C1C}">
+                <a14:useLocalDpi xmlns:a14="http://schemas.microsoft.com/office/drawing/2010/main" val="0"/>
+              </a:ext>
+            </a:extLst>
+          </a:blip>
+          <a:stretch>
+            <a:fillRect/>
+          </a:stretch>
+        </p:blipFill>
+        <p:spPr>
+          <a:xfrm>
+            <a:off x="6261848" y="3464805"/>
+            <a:ext cx="518205" cy="281964"/>
+          </a:xfrm>
+          <a:prstGeom prst="rect">
+            <a:avLst/>
+          </a:prstGeom>
+        </p:spPr>
+      </p:pic>
+      <p:sp>
+        <p:nvSpPr>
+          <p:cNvPr id="10" name="CaixaDeTexto 9"/>
+          <p:cNvSpPr txBox="1"/>
+          <p:nvPr/>
+        </p:nvSpPr>
+        <p:spPr>
+          <a:xfrm>
+            <a:off x="823784" y="4029285"/>
+            <a:ext cx="5354594" cy="1477328"/>
+          </a:xfrm>
+          <a:prstGeom prst="rect">
+            <a:avLst/>
+          </a:prstGeom>
+          <a:noFill/>
+        </p:spPr>
+        <p:txBody>
+          <a:bodyPr wrap="square" rtlCol="0">
+            <a:spAutoFit/>
+          </a:bodyPr>
+          <a:lstStyle/>
+          <a:p>
+            <a:r>
+              <a:rPr lang="pt-BR" dirty="0" smtClean="0"/>
+              <a:t>Há TOS que não contribuem para a predição;</a:t>
+            </a:r>
+            <a:endParaRPr lang="pt-BR" dirty="0"/>
+          </a:p>
+          <a:p>
+            <a:endParaRPr lang="pt-BR" dirty="0" smtClean="0"/>
+          </a:p>
+          <a:p>
+            <a:r>
+              <a:rPr lang="pt-BR" dirty="0" smtClean="0"/>
+              <a:t>Execução mais rápida;</a:t>
+            </a:r>
+          </a:p>
+          <a:p>
+            <a:endParaRPr lang="pt-BR" dirty="0"/>
+          </a:p>
+          <a:p>
+            <a:r>
+              <a:rPr lang="pt-BR" dirty="0" smtClean="0"/>
+              <a:t>O novo espaço será menor para o aprendizado.</a:t>
+            </a:r>
+            <a:endParaRPr lang="pt-BR" dirty="0"/>
+          </a:p>
+        </p:txBody>
+      </p:sp>
+    </p:spTree>
+    <p:extLst>
+      <p:ext uri="{BB962C8B-B14F-4D97-AF65-F5344CB8AC3E}">
+        <p14:creationId xmlns:p14="http://schemas.microsoft.com/office/powerpoint/2010/main" val="2093606571"/>
+      </p:ext>
+    </p:extLst>
+  </p:cSld>
+  <p:clrMapOvr>
+    <a:masterClrMapping/>
+  </p:clrMapOvr>
+  <p:timing>
+    <p:tnLst>
+      <p:par>
+        <p:cTn id="1" dur="indefinite" restart="never" nodeType="tmRoot"/>
+      </p:par>
+    </p:tnLst>
+  </p:timing>
+</p:sld>
+</file>
+
+<file path=ppt/slides/slide11.xml><?xml version="1.0" encoding="utf-8"?>
+<p:sld xmlns:a="http://schemas.openxmlformats.org/drawingml/2006/main" xmlns:r="http://schemas.openxmlformats.org/officeDocument/2006/relationships" xmlns:p="http://schemas.openxmlformats.org/presentationml/2006/main">
+  <p:cSld>
+    <p:spTree>
+      <p:nvGrpSpPr>
+        <p:cNvPr id="1" name=""/>
+        <p:cNvGrpSpPr/>
+        <p:nvPr/>
+      </p:nvGrpSpPr>
+      <p:grpSpPr>
+        <a:xfrm>
+          <a:off x="0" y="0"/>
+          <a:ext cx="0" cy="0"/>
+          <a:chOff x="0" y="0"/>
+          <a:chExt cx="0" cy="0"/>
+        </a:xfrm>
+      </p:grpSpPr>
+      <p:sp>
+        <p:nvSpPr>
+          <p:cNvPr id="3" name="Título 2"/>
+          <p:cNvSpPr>
+            <a:spLocks noGrp="1"/>
+          </p:cNvSpPr>
+          <p:nvPr>
+            <p:ph type="title"/>
+          </p:nvPr>
+        </p:nvSpPr>
+        <p:spPr/>
+        <p:txBody>
+          <a:bodyPr/>
+          <a:lstStyle/>
+          <a:p>
+            <a:r>
+              <a:rPr lang="pt-BR" dirty="0"/>
+              <a:t>Fase 2: Seleção TOS</a:t>
+            </a:r>
+            <a:endParaRPr lang="pt-BR" dirty="0"/>
+          </a:p>
+        </p:txBody>
+      </p:sp>
+      <p:sp>
+        <p:nvSpPr>
+          <p:cNvPr id="4" name="CaixaDeTexto 3"/>
+          <p:cNvSpPr txBox="1"/>
+          <p:nvPr/>
+        </p:nvSpPr>
+        <p:spPr>
+          <a:xfrm>
+            <a:off x="576649" y="2273643"/>
+            <a:ext cx="8435546" cy="3139321"/>
+          </a:xfrm>
+          <a:prstGeom prst="rect">
+            <a:avLst/>
+          </a:prstGeom>
+          <a:noFill/>
+        </p:spPr>
+        <p:txBody>
+          <a:bodyPr wrap="square" rtlCol="0">
+            <a:spAutoFit/>
+          </a:bodyPr>
+          <a:lstStyle/>
+          <a:p>
+            <a:r>
+              <a:rPr lang="pt-BR" dirty="0" smtClean="0"/>
+              <a:t>Três métodos de seleção foram definidos para compor o conjunto S:</a:t>
+            </a:r>
+          </a:p>
+          <a:p>
+            <a:endParaRPr lang="pt-BR" dirty="0"/>
+          </a:p>
+          <a:p>
+            <a:pPr marL="342900" indent="-342900">
+              <a:buAutoNum type="arabicParenR"/>
+            </a:pPr>
+            <a:r>
+              <a:rPr lang="pt-BR" dirty="0" smtClean="0"/>
+              <a:t>Seleção Aleatória: Seleciona p TOS aleatoriamente e adiciona à S sem reposição</a:t>
+            </a:r>
+          </a:p>
+          <a:p>
+            <a:pPr marL="342900" indent="-342900">
+              <a:buAutoNum type="arabicParenR"/>
+            </a:pPr>
+            <a:endParaRPr lang="pt-BR" dirty="0"/>
+          </a:p>
+          <a:p>
+            <a:pPr marL="342900" indent="-342900">
+              <a:buAutoNum type="arabicParenR"/>
+            </a:pPr>
+            <a:r>
+              <a:rPr lang="pt-BR" dirty="0" smtClean="0"/>
+              <a:t>Seleção Precisa: Seleciona as p TOS mais precisas, tomando como medida a ROC curve, por exemplo.</a:t>
+            </a:r>
+          </a:p>
+          <a:p>
+            <a:pPr marL="342900" indent="-342900">
+              <a:buAutoNum type="arabicParenR"/>
+            </a:pPr>
+            <a:endParaRPr lang="pt-BR" dirty="0"/>
+          </a:p>
+          <a:p>
+            <a:pPr marL="342900" indent="-342900">
+              <a:buAutoNum type="arabicParenR"/>
+            </a:pPr>
+            <a:r>
+              <a:rPr lang="pt-BR" dirty="0" smtClean="0"/>
+              <a:t>Seleção Balanceada: Mantém o equilíbrio entre diversidade e acurácia selecionando as TOS que são ambas precisas e diversas.                                                                                                                 Para cada                           uma seleção de TOS é realizada baseada na Seleção Precisa     e para melhorar a diversidade em S, uma função que desconta acurácia é aplicada:</a:t>
+            </a:r>
+            <a:endParaRPr lang="pt-BR" dirty="0"/>
+          </a:p>
+        </p:txBody>
+      </p:sp>
+      <p:pic>
+        <p:nvPicPr>
+          <p:cNvPr id="5" name="Imagem 4"/>
+          <p:cNvPicPr>
+            <a:picLocks noChangeAspect="1"/>
+          </p:cNvPicPr>
+          <p:nvPr/>
+        </p:nvPicPr>
+        <p:blipFill>
+          <a:blip r:embed="rId3">
+            <a:extLst>
+              <a:ext uri="{28A0092B-C50C-407E-A947-70E740481C1C}">
+                <a14:useLocalDpi xmlns:a14="http://schemas.microsoft.com/office/drawing/2010/main" val="0"/>
+              </a:ext>
+            </a:extLst>
+          </a:blip>
+          <a:stretch>
+            <a:fillRect/>
+          </a:stretch>
+        </p:blipFill>
+        <p:spPr>
+          <a:xfrm>
+            <a:off x="3252820" y="3700419"/>
+            <a:ext cx="2793361" cy="500878"/>
+          </a:xfrm>
+          <a:prstGeom prst="rect">
+            <a:avLst/>
+          </a:prstGeom>
+        </p:spPr>
+      </p:pic>
+      <p:pic>
+        <p:nvPicPr>
+          <p:cNvPr id="6" name="Imagem 5"/>
+          <p:cNvPicPr>
+            <a:picLocks noChangeAspect="1"/>
+          </p:cNvPicPr>
+          <p:nvPr/>
+        </p:nvPicPr>
+        <p:blipFill>
+          <a:blip r:embed="rId4">
+            <a:extLst>
+              <a:ext uri="{28A0092B-C50C-407E-A947-70E740481C1C}">
+                <a14:useLocalDpi xmlns:a14="http://schemas.microsoft.com/office/drawing/2010/main" val="0"/>
+              </a:ext>
+            </a:extLst>
+          </a:blip>
+          <a:stretch>
+            <a:fillRect/>
+          </a:stretch>
+        </p:blipFill>
+        <p:spPr>
+          <a:xfrm>
+            <a:off x="1957250" y="4822283"/>
+            <a:ext cx="1341236" cy="297206"/>
+          </a:xfrm>
+          <a:prstGeom prst="rect">
+            <a:avLst/>
+          </a:prstGeom>
+        </p:spPr>
+      </p:pic>
+      <p:pic>
+        <p:nvPicPr>
+          <p:cNvPr id="7" name="Imagem 6"/>
+          <p:cNvPicPr>
+            <a:picLocks noChangeAspect="1"/>
+          </p:cNvPicPr>
+          <p:nvPr/>
+        </p:nvPicPr>
+        <p:blipFill>
+          <a:blip r:embed="rId5">
+            <a:extLst>
+              <a:ext uri="{28A0092B-C50C-407E-A947-70E740481C1C}">
+                <a14:useLocalDpi xmlns:a14="http://schemas.microsoft.com/office/drawing/2010/main" val="0"/>
+              </a:ext>
+            </a:extLst>
+          </a:blip>
+          <a:stretch>
+            <a:fillRect/>
+          </a:stretch>
+        </p:blipFill>
+        <p:spPr>
+          <a:xfrm>
+            <a:off x="3110389" y="5278735"/>
+            <a:ext cx="2812615" cy="1474810"/>
+          </a:xfrm>
+          <a:prstGeom prst="rect">
+            <a:avLst/>
+          </a:prstGeom>
+        </p:spPr>
+      </p:pic>
+    </p:spTree>
+    <p:extLst>
+      <p:ext uri="{BB962C8B-B14F-4D97-AF65-F5344CB8AC3E}">
+        <p14:creationId xmlns:p14="http://schemas.microsoft.com/office/powerpoint/2010/main" val="2659461903"/>
+      </p:ext>
+    </p:extLst>
+  </p:cSld>
+  <p:clrMapOvr>
+    <a:masterClrMapping/>
+  </p:clrMapOvr>
+  <p:timing>
+    <p:tnLst>
+      <p:par>
+        <p:cTn id="1" dur="indefinite" restart="never" nodeType="tmRoot"/>
+      </p:par>
+    </p:tnLst>
+  </p:timing>
+</p:sld>
+</file>
+
+<file path=ppt/slides/slide12.xml><?xml version="1.0" encoding="utf-8"?>
+<p:sld xmlns:a="http://schemas.openxmlformats.org/drawingml/2006/main" xmlns:r="http://schemas.openxmlformats.org/officeDocument/2006/relationships" xmlns:p="http://schemas.openxmlformats.org/presentationml/2006/main">
+  <p:cSld>
+    <p:spTree>
+      <p:nvGrpSpPr>
+        <p:cNvPr id="1" name=""/>
+        <p:cNvGrpSpPr/>
+        <p:nvPr/>
+      </p:nvGrpSpPr>
+      <p:grpSpPr>
+        <a:xfrm>
+          <a:off x="0" y="0"/>
+          <a:ext cx="0" cy="0"/>
+          <a:chOff x="0" y="0"/>
+          <a:chExt cx="0" cy="0"/>
+        </a:xfrm>
+      </p:grpSpPr>
+      <p:sp>
+        <p:nvSpPr>
+          <p:cNvPr id="3" name="Título 2"/>
+          <p:cNvSpPr>
+            <a:spLocks noGrp="1"/>
+          </p:cNvSpPr>
+          <p:nvPr>
+            <p:ph type="title"/>
+          </p:nvPr>
+        </p:nvSpPr>
+        <p:spPr/>
+        <p:txBody>
+          <a:bodyPr/>
+          <a:lstStyle/>
+          <a:p>
+            <a:r>
+              <a:rPr lang="pt-BR" dirty="0"/>
+              <a:t>Fase 2: Seleção TOS</a:t>
+            </a:r>
+            <a:endParaRPr lang="pt-BR" dirty="0"/>
+          </a:p>
+        </p:txBody>
+      </p:sp>
+      <p:pic>
+        <p:nvPicPr>
+          <p:cNvPr id="2" name="Imagem 1"/>
+          <p:cNvPicPr>
+            <a:picLocks noChangeAspect="1"/>
+          </p:cNvPicPr>
+          <p:nvPr/>
+        </p:nvPicPr>
+        <p:blipFill>
+          <a:blip r:embed="rId3">
+            <a:extLst>
+              <a:ext uri="{28A0092B-C50C-407E-A947-70E740481C1C}">
+                <a14:useLocalDpi xmlns:a14="http://schemas.microsoft.com/office/drawing/2010/main" val="0"/>
+              </a:ext>
+            </a:extLst>
+          </a:blip>
+          <a:stretch>
+            <a:fillRect/>
+          </a:stretch>
+        </p:blipFill>
+        <p:spPr>
+          <a:xfrm>
+            <a:off x="2003836" y="1484284"/>
+            <a:ext cx="5405799" cy="5373716"/>
+          </a:xfrm>
+          <a:prstGeom prst="rect">
+            <a:avLst/>
+          </a:prstGeom>
+        </p:spPr>
+      </p:pic>
+    </p:spTree>
+    <p:extLst>
+      <p:ext uri="{BB962C8B-B14F-4D97-AF65-F5344CB8AC3E}">
+        <p14:creationId xmlns:p14="http://schemas.microsoft.com/office/powerpoint/2010/main" val="1182069021"/>
+      </p:ext>
+    </p:extLst>
+  </p:cSld>
+  <p:clrMapOvr>
+    <a:masterClrMapping/>
+  </p:clrMapOvr>
+  <p:timing>
+    <p:tnLst>
+      <p:par>
+        <p:cTn id="1" dur="indefinite" restart="never" nodeType="tmRoot"/>
+      </p:par>
+    </p:tnLst>
+  </p:timing>
+</p:sld>
+</file>
+
+<file path=ppt/slides/slide13.xml><?xml version="1.0" encoding="utf-8"?>
+<p:sld xmlns:a="http://schemas.openxmlformats.org/drawingml/2006/main" xmlns:r="http://schemas.openxmlformats.org/officeDocument/2006/relationships" xmlns:p="http://schemas.openxmlformats.org/presentationml/2006/main">
+  <p:cSld>
+    <p:spTree>
+      <p:nvGrpSpPr>
+        <p:cNvPr id="1" name=""/>
+        <p:cNvGrpSpPr/>
+        <p:nvPr/>
+      </p:nvGrpSpPr>
+      <p:grpSpPr>
+        <a:xfrm>
+          <a:off x="0" y="0"/>
+          <a:ext cx="0" cy="0"/>
+          <a:chOff x="0" y="0"/>
+          <a:chExt cx="0" cy="0"/>
+        </a:xfrm>
+      </p:grpSpPr>
+      <p:sp>
+        <p:nvSpPr>
+          <p:cNvPr id="3" name="Título 2"/>
+          <p:cNvSpPr>
+            <a:spLocks noGrp="1"/>
+          </p:cNvSpPr>
+          <p:nvPr>
+            <p:ph type="title"/>
+          </p:nvPr>
+        </p:nvSpPr>
+        <p:spPr/>
+        <p:txBody>
+          <a:bodyPr/>
+          <a:lstStyle/>
+          <a:p>
+            <a:r>
+              <a:rPr lang="pt-BR" dirty="0"/>
+              <a:t>Fase 2: Seleção TOS</a:t>
+            </a:r>
+            <a:endParaRPr lang="pt-BR" dirty="0"/>
+          </a:p>
+        </p:txBody>
+      </p:sp>
+      <p:sp>
+        <p:nvSpPr>
+          <p:cNvPr id="2" name="CaixaDeTexto 1"/>
+          <p:cNvSpPr txBox="1"/>
+          <p:nvPr/>
+        </p:nvSpPr>
+        <p:spPr>
+          <a:xfrm>
+            <a:off x="799069" y="1738184"/>
+            <a:ext cx="6458465" cy="369332"/>
+          </a:xfrm>
+          <a:prstGeom prst="rect">
+            <a:avLst/>
+          </a:prstGeom>
+          <a:noFill/>
+        </p:spPr>
+        <p:txBody>
+          <a:bodyPr wrap="square" rtlCol="0">
+            <a:spAutoFit/>
+          </a:bodyPr>
+          <a:lstStyle/>
+          <a:p>
+            <a:r>
+              <a:rPr lang="pt-BR" dirty="0" smtClean="0"/>
+              <a:t>Como resultado, tem-se p TOS selecionadas como </a:t>
+            </a:r>
+            <a:endParaRPr lang="pt-BR" dirty="0"/>
+          </a:p>
+        </p:txBody>
+      </p:sp>
+      <p:pic>
+        <p:nvPicPr>
+          <p:cNvPr id="4" name="Imagem 3"/>
+          <p:cNvPicPr>
+            <a:picLocks noChangeAspect="1"/>
+          </p:cNvPicPr>
+          <p:nvPr/>
+        </p:nvPicPr>
+        <p:blipFill>
+          <a:blip r:embed="rId3">
+            <a:extLst>
+              <a:ext uri="{28A0092B-C50C-407E-A947-70E740481C1C}">
+                <a14:useLocalDpi xmlns:a14="http://schemas.microsoft.com/office/drawing/2010/main" val="0"/>
+              </a:ext>
+            </a:extLst>
+          </a:blip>
+          <a:stretch>
+            <a:fillRect/>
+          </a:stretch>
+        </p:blipFill>
+        <p:spPr>
+          <a:xfrm>
+            <a:off x="5715583" y="1738184"/>
+            <a:ext cx="1187725" cy="454131"/>
+          </a:xfrm>
+          <a:prstGeom prst="rect">
+            <a:avLst/>
+          </a:prstGeom>
+        </p:spPr>
+      </p:pic>
+      <p:sp>
+        <p:nvSpPr>
+          <p:cNvPr id="5" name="CaixaDeTexto 4"/>
+          <p:cNvSpPr txBox="1"/>
+          <p:nvPr/>
+        </p:nvSpPr>
+        <p:spPr>
+          <a:xfrm>
+            <a:off x="856736" y="2575699"/>
+            <a:ext cx="6046572" cy="369332"/>
+          </a:xfrm>
+          <a:prstGeom prst="rect">
+            <a:avLst/>
+          </a:prstGeom>
+          <a:noFill/>
+        </p:spPr>
+        <p:txBody>
+          <a:bodyPr wrap="square" rtlCol="0">
+            <a:spAutoFit/>
+          </a:bodyPr>
+          <a:lstStyle/>
+          <a:p>
+            <a:r>
+              <a:rPr lang="pt-BR" dirty="0" smtClean="0"/>
+              <a:t>Por fim, o novo espaço é criado concatenando X com S:</a:t>
+            </a:r>
+            <a:endParaRPr lang="pt-BR" dirty="0"/>
+          </a:p>
+        </p:txBody>
+      </p:sp>
+      <p:pic>
+        <p:nvPicPr>
+          <p:cNvPr id="6" name="Imagem 5"/>
+          <p:cNvPicPr>
+            <a:picLocks noChangeAspect="1"/>
+          </p:cNvPicPr>
+          <p:nvPr/>
+        </p:nvPicPr>
+        <p:blipFill>
+          <a:blip r:embed="rId4">
+            <a:extLst>
+              <a:ext uri="{28A0092B-C50C-407E-A947-70E740481C1C}">
+                <a14:useLocalDpi xmlns:a14="http://schemas.microsoft.com/office/drawing/2010/main" val="0"/>
+              </a:ext>
+            </a:extLst>
+          </a:blip>
+          <a:stretch>
+            <a:fillRect/>
+          </a:stretch>
+        </p:blipFill>
+        <p:spPr>
+          <a:xfrm>
+            <a:off x="2269902" y="3085525"/>
+            <a:ext cx="4587300" cy="475310"/>
+          </a:xfrm>
+          <a:prstGeom prst="rect">
+            <a:avLst/>
+          </a:prstGeom>
+        </p:spPr>
+      </p:pic>
+      <p:sp>
+        <p:nvSpPr>
+          <p:cNvPr id="7" name="CaixaDeTexto 6"/>
+          <p:cNvSpPr txBox="1"/>
+          <p:nvPr/>
+        </p:nvSpPr>
+        <p:spPr>
+          <a:xfrm>
+            <a:off x="799070" y="3838442"/>
+            <a:ext cx="7834184" cy="646331"/>
+          </a:xfrm>
+          <a:prstGeom prst="rect">
+            <a:avLst/>
+          </a:prstGeom>
+          <a:noFill/>
+        </p:spPr>
+        <p:txBody>
+          <a:bodyPr wrap="square" rtlCol="0">
+            <a:spAutoFit/>
+          </a:bodyPr>
+          <a:lstStyle/>
+          <a:p>
+            <a:r>
+              <a:rPr lang="pt-BR" dirty="0" smtClean="0"/>
+              <a:t>Interessante notar que                        foram descartadas, para melhorar a eficiência e predição do algoritmo </a:t>
+            </a:r>
+            <a:endParaRPr lang="pt-BR" dirty="0"/>
+          </a:p>
+        </p:txBody>
+      </p:sp>
+      <p:pic>
+        <p:nvPicPr>
+          <p:cNvPr id="8" name="Imagem 7"/>
+          <p:cNvPicPr>
+            <a:picLocks noChangeAspect="1"/>
+          </p:cNvPicPr>
+          <p:nvPr/>
+        </p:nvPicPr>
+        <p:blipFill>
+          <a:blip r:embed="rId5">
+            <a:extLst>
+              <a:ext uri="{28A0092B-C50C-407E-A947-70E740481C1C}">
+                <a14:useLocalDpi xmlns:a14="http://schemas.microsoft.com/office/drawing/2010/main" val="0"/>
+              </a:ext>
+            </a:extLst>
+          </a:blip>
+          <a:stretch>
+            <a:fillRect/>
+          </a:stretch>
+        </p:blipFill>
+        <p:spPr>
+          <a:xfrm>
+            <a:off x="3060409" y="3932822"/>
+            <a:ext cx="1120237" cy="274344"/>
+          </a:xfrm>
+          <a:prstGeom prst="rect">
+            <a:avLst/>
+          </a:prstGeom>
+        </p:spPr>
+      </p:pic>
+    </p:spTree>
+    <p:extLst>
+      <p:ext uri="{BB962C8B-B14F-4D97-AF65-F5344CB8AC3E}">
+        <p14:creationId xmlns:p14="http://schemas.microsoft.com/office/powerpoint/2010/main" val="3819858960"/>
+      </p:ext>
+    </p:extLst>
+  </p:cSld>
+  <p:clrMapOvr>
+    <a:masterClrMapping/>
+  </p:clrMapOvr>
+  <p:timing>
+    <p:tnLst>
+      <p:par>
+        <p:cTn id="1" dur="indefinite" restart="never" nodeType="tmRoot"/>
+      </p:par>
+    </p:tnLst>
+  </p:timing>
+</p:sld>
+</file>
+
+<file path=ppt/slides/slide14.xml><?xml version="1.0" encoding="utf-8"?>
+<p:sld xmlns:a="http://schemas.openxmlformats.org/drawingml/2006/main" xmlns:r="http://schemas.openxmlformats.org/officeDocument/2006/relationships" xmlns:p="http://schemas.openxmlformats.org/presentationml/2006/main">
+  <p:cSld>
+    <p:spTree>
+      <p:nvGrpSpPr>
+        <p:cNvPr id="1" name=""/>
+        <p:cNvGrpSpPr/>
+        <p:nvPr/>
+      </p:nvGrpSpPr>
+      <p:grpSpPr>
+        <a:xfrm>
+          <a:off x="0" y="0"/>
+          <a:ext cx="0" cy="0"/>
+          <a:chOff x="0" y="0"/>
+          <a:chExt cx="0" cy="0"/>
+        </a:xfrm>
+      </p:grpSpPr>
+      <p:sp>
+        <p:nvSpPr>
+          <p:cNvPr id="3" name="Título 2"/>
+          <p:cNvSpPr>
+            <a:spLocks noGrp="1"/>
+          </p:cNvSpPr>
+          <p:nvPr>
+            <p:ph type="title"/>
+          </p:nvPr>
+        </p:nvSpPr>
+        <p:spPr/>
+        <p:txBody>
+          <a:bodyPr/>
+          <a:lstStyle/>
+          <a:p>
+            <a:r>
+              <a:rPr lang="pt-BR" dirty="0" smtClean="0"/>
+              <a:t>Fase 3: Predição com </a:t>
+            </a:r>
+            <a:r>
+              <a:rPr lang="pt-BR" dirty="0" err="1" smtClean="0"/>
+              <a:t>XGBoost</a:t>
+            </a:r>
+            <a:endParaRPr lang="pt-BR" dirty="0"/>
+          </a:p>
+        </p:txBody>
+      </p:sp>
+      <p:pic>
+        <p:nvPicPr>
+          <p:cNvPr id="2" name="Imagem 1"/>
+          <p:cNvPicPr>
+            <a:picLocks noChangeAspect="1"/>
+          </p:cNvPicPr>
+          <p:nvPr/>
+        </p:nvPicPr>
+        <p:blipFill>
+          <a:blip r:embed="rId3">
+            <a:extLst>
+              <a:ext uri="{28A0092B-C50C-407E-A947-70E740481C1C}">
+                <a14:useLocalDpi xmlns:a14="http://schemas.microsoft.com/office/drawing/2010/main" val="0"/>
+              </a:ext>
+            </a:extLst>
+          </a:blip>
+          <a:stretch>
+            <a:fillRect/>
+          </a:stretch>
+        </p:blipFill>
+        <p:spPr>
+          <a:xfrm>
+            <a:off x="1355168" y="1942219"/>
+            <a:ext cx="6433663" cy="1995468"/>
+          </a:xfrm>
+          <a:prstGeom prst="rect">
+            <a:avLst/>
+          </a:prstGeom>
+        </p:spPr>
+      </p:pic>
+    </p:spTree>
+    <p:extLst>
+      <p:ext uri="{BB962C8B-B14F-4D97-AF65-F5344CB8AC3E}">
+        <p14:creationId xmlns:p14="http://schemas.microsoft.com/office/powerpoint/2010/main" val="1159911970"/>
+      </p:ext>
+    </p:extLst>
+  </p:cSld>
+  <p:clrMapOvr>
+    <a:masterClrMapping/>
+  </p:clrMapOvr>
+  <p:timing>
+    <p:tnLst>
+      <p:par>
+        <p:cTn id="1" dur="indefinite" restart="never" nodeType="tmRoot"/>
+      </p:par>
+    </p:tnLst>
+  </p:timing>
+</p:sld>
+</file>
+
+<file path=ppt/slides/slide15.xml><?xml version="1.0" encoding="utf-8"?>
+<p:sld xmlns:a="http://schemas.openxmlformats.org/drawingml/2006/main" xmlns:r="http://schemas.openxmlformats.org/officeDocument/2006/relationships" xmlns:p="http://schemas.openxmlformats.org/presentationml/2006/main">
+  <p:cSld>
+    <p:spTree>
+      <p:nvGrpSpPr>
+        <p:cNvPr id="1" name=""/>
+        <p:cNvGrpSpPr/>
+        <p:nvPr/>
+      </p:nvGrpSpPr>
+      <p:grpSpPr>
+        <a:xfrm>
+          <a:off x="0" y="0"/>
+          <a:ext cx="0" cy="0"/>
+          <a:chOff x="0" y="0"/>
+          <a:chExt cx="0" cy="0"/>
+        </a:xfrm>
+      </p:grpSpPr>
+      <p:sp>
+        <p:nvSpPr>
+          <p:cNvPr id="3" name="Título 2"/>
+          <p:cNvSpPr>
+            <a:spLocks noGrp="1"/>
+          </p:cNvSpPr>
+          <p:nvPr>
+            <p:ph type="title"/>
+          </p:nvPr>
+        </p:nvSpPr>
+        <p:spPr/>
+        <p:txBody>
+          <a:bodyPr/>
+          <a:lstStyle/>
+          <a:p>
+            <a:endParaRPr lang="pt-BR" dirty="0"/>
+          </a:p>
+        </p:txBody>
+      </p:sp>
+    </p:spTree>
+    <p:extLst>
+      <p:ext uri="{BB962C8B-B14F-4D97-AF65-F5344CB8AC3E}">
+        <p14:creationId xmlns:p14="http://schemas.microsoft.com/office/powerpoint/2010/main" val="320163065"/>
+      </p:ext>
+    </p:extLst>
+  </p:cSld>
+  <p:clrMapOvr>
+    <a:masterClrMapping/>
+  </p:clrMapOvr>
+  <p:timing>
+    <p:tnLst>
+      <p:par>
+        <p:cTn id="1" dur="indefinite" restart="never" nodeType="tmRoot"/>
+      </p:par>
+    </p:tnLst>
+  </p:timing>
+</p:sld>
+</file>
+
+<file path=ppt/slides/slide16.xml><?xml version="1.0" encoding="utf-8"?>
+<p:sld xmlns:a="http://schemas.openxmlformats.org/drawingml/2006/main" xmlns:r="http://schemas.openxmlformats.org/officeDocument/2006/relationships" xmlns:p="http://schemas.openxmlformats.org/presentationml/2006/main">
+  <p:cSld>
+    <p:spTree>
+      <p:nvGrpSpPr>
+        <p:cNvPr id="1" name=""/>
+        <p:cNvGrpSpPr/>
+        <p:nvPr/>
+      </p:nvGrpSpPr>
+      <p:grpSpPr>
+        <a:xfrm>
+          <a:off x="0" y="0"/>
+          <a:ext cx="0" cy="0"/>
+          <a:chOff x="0" y="0"/>
+          <a:chExt cx="0" cy="0"/>
+        </a:xfrm>
+      </p:grpSpPr>
+      <p:sp>
+        <p:nvSpPr>
+          <p:cNvPr id="3" name="Título 2"/>
+          <p:cNvSpPr>
+            <a:spLocks noGrp="1"/>
+          </p:cNvSpPr>
+          <p:nvPr>
+            <p:ph type="title"/>
+          </p:nvPr>
+        </p:nvSpPr>
+        <p:spPr/>
+        <p:txBody>
+          <a:bodyPr/>
+          <a:lstStyle/>
+          <a:p>
+            <a:endParaRPr lang="pt-BR" dirty="0"/>
+          </a:p>
+        </p:txBody>
+      </p:sp>
+    </p:spTree>
+    <p:extLst>
+      <p:ext uri="{BB962C8B-B14F-4D97-AF65-F5344CB8AC3E}">
+        <p14:creationId xmlns:p14="http://schemas.microsoft.com/office/powerpoint/2010/main" val="2937895781"/>
+      </p:ext>
+    </p:extLst>
+  </p:cSld>
+  <p:clrMapOvr>
+    <a:masterClrMapping/>
+  </p:clrMapOvr>
+  <p:timing>
+    <p:tnLst>
+      <p:par>
+        <p:cTn id="1" dur="indefinite" restart="never" nodeType="tmRoot"/>
+      </p:par>
+    </p:tnLst>
+  </p:timing>
+</p:sld>
+</file>
+
+<file path=ppt/slides/slide17.xml><?xml version="1.0" encoding="utf-8"?>
+<p:sld xmlns:a="http://schemas.openxmlformats.org/drawingml/2006/main" xmlns:r="http://schemas.openxmlformats.org/officeDocument/2006/relationships" xmlns:p="http://schemas.openxmlformats.org/presentationml/2006/main">
+  <p:cSld>
+    <p:spTree>
+      <p:nvGrpSpPr>
+        <p:cNvPr id="1" name=""/>
+        <p:cNvGrpSpPr/>
+        <p:nvPr/>
+      </p:nvGrpSpPr>
+      <p:grpSpPr>
+        <a:xfrm>
+          <a:off x="0" y="0"/>
+          <a:ext cx="0" cy="0"/>
+          <a:chOff x="0" y="0"/>
+          <a:chExt cx="0" cy="0"/>
+        </a:xfrm>
+      </p:grpSpPr>
+      <p:sp>
+        <p:nvSpPr>
+          <p:cNvPr id="3" name="Título 2"/>
+          <p:cNvSpPr>
+            <a:spLocks noGrp="1"/>
+          </p:cNvSpPr>
+          <p:nvPr>
+            <p:ph type="title"/>
+          </p:nvPr>
+        </p:nvSpPr>
+        <p:spPr/>
+        <p:txBody>
+          <a:bodyPr/>
+          <a:lstStyle/>
+          <a:p>
+            <a:endParaRPr lang="pt-BR" dirty="0"/>
+          </a:p>
+        </p:txBody>
+      </p:sp>
+    </p:spTree>
+    <p:extLst>
+      <p:ext uri="{BB962C8B-B14F-4D97-AF65-F5344CB8AC3E}">
+        <p14:creationId xmlns:p14="http://schemas.microsoft.com/office/powerpoint/2010/main" val="2650892249"/>
+      </p:ext>
+    </p:extLst>
+  </p:cSld>
+  <p:clrMapOvr>
+    <a:masterClrMapping/>
+  </p:clrMapOvr>
+  <p:timing>
+    <p:tnLst>
+      <p:par>
+        <p:cTn id="1" dur="indefinite" restart="never" nodeType="tmRoot"/>
+      </p:par>
+    </p:tnLst>
+  </p:timing>
+</p:sld>
+</file>
+
+<file path=ppt/slides/slide18.xml><?xml version="1.0" encoding="utf-8"?>
+<p:sld xmlns:a="http://schemas.openxmlformats.org/drawingml/2006/main" xmlns:r="http://schemas.openxmlformats.org/officeDocument/2006/relationships" xmlns:p="http://schemas.openxmlformats.org/presentationml/2006/main">
+  <p:cSld>
+    <p:spTree>
+      <p:nvGrpSpPr>
+        <p:cNvPr id="1" name=""/>
+        <p:cNvGrpSpPr/>
+        <p:nvPr/>
+      </p:nvGrpSpPr>
+      <p:grpSpPr>
+        <a:xfrm>
+          <a:off x="0" y="0"/>
+          <a:ext cx="0" cy="0"/>
+          <a:chOff x="0" y="0"/>
+          <a:chExt cx="0" cy="0"/>
+        </a:xfrm>
+      </p:grpSpPr>
+      <p:sp>
+        <p:nvSpPr>
+          <p:cNvPr id="3" name="Título 2"/>
+          <p:cNvSpPr>
+            <a:spLocks noGrp="1"/>
+          </p:cNvSpPr>
+          <p:nvPr>
+            <p:ph type="title"/>
+          </p:nvPr>
+        </p:nvSpPr>
+        <p:spPr/>
+        <p:txBody>
+          <a:bodyPr/>
+          <a:lstStyle/>
+          <a:p>
+            <a:endParaRPr lang="pt-BR" dirty="0"/>
+          </a:p>
+        </p:txBody>
+      </p:sp>
+    </p:spTree>
+    <p:extLst>
+      <p:ext uri="{BB962C8B-B14F-4D97-AF65-F5344CB8AC3E}">
+        <p14:creationId xmlns:p14="http://schemas.microsoft.com/office/powerpoint/2010/main" val="343902946"/>
+      </p:ext>
+    </p:extLst>
+  </p:cSld>
+  <p:clrMapOvr>
+    <a:masterClrMapping/>
+  </p:clrMapOvr>
+  <p:timing>
+    <p:tnLst>
+      <p:par>
+        <p:cTn id="1" dur="indefinite" restart="never" nodeType="tmRoot"/>
+      </p:par>
+    </p:tnLst>
+  </p:timing>
+</p:sld>
+</file>
+
+<file path=ppt/slides/slide19.xml><?xml version="1.0" encoding="utf-8"?>
+<p:sld xmlns:a="http://schemas.openxmlformats.org/drawingml/2006/main" xmlns:r="http://schemas.openxmlformats.org/officeDocument/2006/relationships" xmlns:p="http://schemas.openxmlformats.org/presentationml/2006/main">
+  <p:cSld>
+    <p:spTree>
+      <p:nvGrpSpPr>
+        <p:cNvPr id="1" name=""/>
+        <p:cNvGrpSpPr/>
+        <p:nvPr/>
+      </p:nvGrpSpPr>
+      <p:grpSpPr>
+        <a:xfrm>
+          <a:off x="0" y="0"/>
+          <a:ext cx="0" cy="0"/>
+          <a:chOff x="0" y="0"/>
+          <a:chExt cx="0" cy="0"/>
+        </a:xfrm>
+      </p:grpSpPr>
+      <p:sp>
+        <p:nvSpPr>
+          <p:cNvPr id="2" name="Espaço Reservado para Conteúdo 1"/>
+          <p:cNvSpPr>
+            <a:spLocks noGrp="1"/>
+          </p:cNvSpPr>
+          <p:nvPr>
+            <p:ph idx="1"/>
+          </p:nvPr>
+        </p:nvSpPr>
+        <p:spPr>
+          <a:xfrm>
+            <a:off x="628650" y="2680202"/>
+            <a:ext cx="7886700" cy="1914100"/>
+          </a:xfrm>
+        </p:spPr>
+        <p:txBody>
+          <a:bodyPr/>
+          <a:lstStyle/>
+          <a:p>
+            <a:pPr marL="0" indent="0">
+              <a:buNone/>
+            </a:pPr>
+            <a:endParaRPr lang="pt-BR" dirty="0" smtClean="0"/>
+          </a:p>
+        </p:txBody>
+      </p:sp>
+      <p:sp>
+        <p:nvSpPr>
+          <p:cNvPr id="3" name="Título 2"/>
+          <p:cNvSpPr>
+            <a:spLocks noGrp="1"/>
+          </p:cNvSpPr>
+          <p:nvPr>
+            <p:ph type="title"/>
+          </p:nvPr>
+        </p:nvSpPr>
+        <p:spPr/>
+        <p:txBody>
+          <a:bodyPr/>
+          <a:lstStyle/>
+          <a:p>
+            <a:r>
+              <a:rPr lang="pt-BR" dirty="0" smtClean="0"/>
+              <a:t>Implementação</a:t>
+            </a:r>
+            <a:endParaRPr lang="pt-BR" dirty="0"/>
+          </a:p>
+        </p:txBody>
+      </p:sp>
+    </p:spTree>
+    <p:extLst>
+      <p:ext uri="{BB962C8B-B14F-4D97-AF65-F5344CB8AC3E}">
+        <p14:creationId xmlns:p14="http://schemas.microsoft.com/office/powerpoint/2010/main" val="1607534576"/>
+      </p:ext>
+    </p:extLst>
+  </p:cSld>
+  <p:clrMapOvr>
+    <a:masterClrMapping/>
+  </p:clrMapOvr>
+  <p:timing>
+    <p:tnLst>
+      <p:par>
+        <p:cTn id="1" dur="indefinite" restart="never" nodeType="tmRoot"/>
+      </p:par>
+    </p:tnLst>
+  </p:timing>
+</p:sld>
+</file>
+
+<file path=ppt/slides/slide2.xml><?xml version="1.0" encoding="utf-8"?>
+<p:sld xmlns:a="http://schemas.openxmlformats.org/drawingml/2006/main" xmlns:r="http://schemas.openxmlformats.org/officeDocument/2006/relationships" xmlns:p="http://schemas.openxmlformats.org/presentationml/2006/main">
+  <p:cSld>
+    <p:spTree>
+      <p:nvGrpSpPr>
+        <p:cNvPr id="1" name=""/>
+        <p:cNvGrpSpPr/>
+        <p:nvPr/>
+      </p:nvGrpSpPr>
+      <p:grpSpPr>
+        <a:xfrm>
+          <a:off x="0" y="0"/>
+          <a:ext cx="0" cy="0"/>
+          <a:chOff x="0" y="0"/>
+          <a:chExt cx="0" cy="0"/>
+        </a:xfrm>
+      </p:grpSpPr>
+      <p:sp>
+        <p:nvSpPr>
+          <p:cNvPr id="3" name="Título 2"/>
+          <p:cNvSpPr>
+            <a:spLocks noGrp="1"/>
+          </p:cNvSpPr>
+          <p:nvPr>
+            <p:ph type="title"/>
+          </p:nvPr>
+        </p:nvSpPr>
+        <p:spPr/>
+        <p:txBody>
+          <a:bodyPr>
+            <a:normAutofit/>
+          </a:bodyPr>
+          <a:lstStyle/>
+          <a:p>
+            <a:r>
+              <a:rPr lang="pt-BR" dirty="0" smtClean="0"/>
+              <a:t>Motivação</a:t>
+            </a:r>
+            <a:endParaRPr lang="pt-BR" dirty="0"/>
+          </a:p>
+        </p:txBody>
+      </p:sp>
+    </p:spTree>
+    <p:extLst>
+      <p:ext uri="{BB962C8B-B14F-4D97-AF65-F5344CB8AC3E}">
+        <p14:creationId xmlns:p14="http://schemas.microsoft.com/office/powerpoint/2010/main" val="3864786897"/>
+      </p:ext>
+    </p:extLst>
+  </p:cSld>
+  <p:clrMapOvr>
+    <a:masterClrMapping/>
+  </p:clrMapOvr>
+  <p:timing>
+    <p:tnLst>
+      <p:par>
+        <p:cTn id="1" dur="indefinite" restart="never" nodeType="tmRoot"/>
+      </p:par>
+    </p:tnLst>
+  </p:timing>
+</p:sld>
+</file>
+
+<file path=ppt/slides/slide20.xml><?xml version="1.0" encoding="utf-8"?>
+<p:sld xmlns:a="http://schemas.openxmlformats.org/drawingml/2006/main" xmlns:r="http://schemas.openxmlformats.org/officeDocument/2006/relationships" xmlns:p="http://schemas.openxmlformats.org/presentationml/2006/main">
+  <p:cSld>
+    <p:spTree>
+      <p:nvGrpSpPr>
+        <p:cNvPr id="1" name=""/>
+        <p:cNvGrpSpPr/>
+        <p:nvPr/>
+      </p:nvGrpSpPr>
+      <p:grpSpPr>
+        <a:xfrm>
+          <a:off x="0" y="0"/>
+          <a:ext cx="0" cy="0"/>
+          <a:chOff x="0" y="0"/>
+          <a:chExt cx="0" cy="0"/>
+        </a:xfrm>
+      </p:grpSpPr>
+      <p:sp>
+        <p:nvSpPr>
+          <p:cNvPr id="2" name="Espaço Reservado para Conteúdo 1"/>
+          <p:cNvSpPr>
+            <a:spLocks noGrp="1"/>
+          </p:cNvSpPr>
+          <p:nvPr>
+            <p:ph idx="1"/>
+          </p:nvPr>
+        </p:nvSpPr>
+        <p:spPr>
+          <a:xfrm>
+            <a:off x="628650" y="2680202"/>
+            <a:ext cx="7886700" cy="1914100"/>
+          </a:xfrm>
+        </p:spPr>
+        <p:txBody>
+          <a:bodyPr/>
+          <a:lstStyle/>
+          <a:p>
+            <a:pPr marL="0" indent="0">
+              <a:buNone/>
+            </a:pPr>
+            <a:endParaRPr lang="pt-BR" dirty="0" smtClean="0"/>
+          </a:p>
+        </p:txBody>
+      </p:sp>
+      <p:sp>
+        <p:nvSpPr>
+          <p:cNvPr id="3" name="Título 2"/>
+          <p:cNvSpPr>
+            <a:spLocks noGrp="1"/>
+          </p:cNvSpPr>
+          <p:nvPr>
+            <p:ph type="title"/>
+          </p:nvPr>
+        </p:nvSpPr>
+        <p:spPr/>
+        <p:txBody>
+          <a:bodyPr/>
+          <a:lstStyle/>
+          <a:p>
+            <a:r>
+              <a:rPr lang="pt-BR" dirty="0" smtClean="0"/>
+              <a:t>Resultados</a:t>
+            </a:r>
+            <a:endParaRPr lang="pt-BR" dirty="0"/>
+          </a:p>
+        </p:txBody>
+      </p:sp>
+    </p:spTree>
+    <p:extLst>
+      <p:ext uri="{BB962C8B-B14F-4D97-AF65-F5344CB8AC3E}">
+        <p14:creationId xmlns:p14="http://schemas.microsoft.com/office/powerpoint/2010/main" val="2931453190"/>
+      </p:ext>
+    </p:extLst>
+  </p:cSld>
+  <p:clrMapOvr>
+    <a:masterClrMapping/>
+  </p:clrMapOvr>
+  <p:timing>
+    <p:tnLst>
+      <p:par>
+        <p:cTn id="1" dur="indefinite" restart="never" nodeType="tmRoot"/>
+      </p:par>
+    </p:tnLst>
+  </p:timing>
+</p:sld>
+</file>
+
+<file path=ppt/slides/slide21.xml><?xml version="1.0" encoding="utf-8"?>
+<p:sld xmlns:a="http://schemas.openxmlformats.org/drawingml/2006/main" xmlns:r="http://schemas.openxmlformats.org/officeDocument/2006/relationships" xmlns:p="http://schemas.openxmlformats.org/presentationml/2006/main">
+  <p:cSld>
+    <p:spTree>
+      <p:nvGrpSpPr>
+        <p:cNvPr id="1" name=""/>
+        <p:cNvGrpSpPr/>
+        <p:nvPr/>
+      </p:nvGrpSpPr>
+      <p:grpSpPr>
+        <a:xfrm>
+          <a:off x="0" y="0"/>
+          <a:ext cx="0" cy="0"/>
+          <a:chOff x="0" y="0"/>
+          <a:chExt cx="0" cy="0"/>
+        </a:xfrm>
+      </p:grpSpPr>
+      <p:sp>
+        <p:nvSpPr>
+          <p:cNvPr id="2" name="Espaço Reservado para Conteúdo 1"/>
+          <p:cNvSpPr>
+            <a:spLocks noGrp="1"/>
+          </p:cNvSpPr>
+          <p:nvPr>
+            <p:ph idx="1"/>
+          </p:nvPr>
+        </p:nvSpPr>
+        <p:spPr>
+          <a:xfrm>
+            <a:off x="628650" y="2680202"/>
+            <a:ext cx="7886700" cy="1914100"/>
+          </a:xfrm>
+        </p:spPr>
+        <p:txBody>
+          <a:bodyPr/>
+          <a:lstStyle/>
+          <a:p>
+            <a:pPr marL="0" indent="0">
+              <a:buNone/>
+            </a:pPr>
+            <a:endParaRPr lang="pt-BR" dirty="0" smtClean="0"/>
+          </a:p>
+        </p:txBody>
+      </p:sp>
+      <p:sp>
+        <p:nvSpPr>
+          <p:cNvPr id="3" name="Título 2"/>
+          <p:cNvSpPr>
+            <a:spLocks noGrp="1"/>
+          </p:cNvSpPr>
+          <p:nvPr>
+            <p:ph type="title"/>
+          </p:nvPr>
+        </p:nvSpPr>
+        <p:spPr/>
+        <p:txBody>
+          <a:bodyPr/>
+          <a:lstStyle/>
+          <a:p>
+            <a:r>
+              <a:rPr lang="pt-BR" dirty="0" err="1"/>
+              <a:t>Takeaways</a:t>
+            </a:r>
+            <a:endParaRPr lang="pt-BR" dirty="0"/>
+          </a:p>
+        </p:txBody>
+      </p:sp>
+    </p:spTree>
+    <p:extLst>
+      <p:ext uri="{BB962C8B-B14F-4D97-AF65-F5344CB8AC3E}">
+        <p14:creationId xmlns:p14="http://schemas.microsoft.com/office/powerpoint/2010/main" val="4259043873"/>
+      </p:ext>
+    </p:extLst>
+  </p:cSld>
+  <p:clrMapOvr>
+    <a:masterClrMapping/>
+  </p:clrMapOvr>
+  <p:timing>
+    <p:tnLst>
+      <p:par>
+        <p:cTn id="1" dur="indefinite" restart="never" nodeType="tmRoot"/>
+      </p:par>
+    </p:tnLst>
+  </p:timing>
+</p:sld>
+</file>
+
+<file path=ppt/slides/slide22.xml><?xml version="1.0" encoding="utf-8"?>
+<p:sld xmlns:a="http://schemas.openxmlformats.org/drawingml/2006/main" xmlns:r="http://schemas.openxmlformats.org/officeDocument/2006/relationships" xmlns:p="http://schemas.openxmlformats.org/presentationml/2006/main">
+  <p:cSld>
+    <p:spTree>
+      <p:nvGrpSpPr>
+        <p:cNvPr id="1" name=""/>
+        <p:cNvGrpSpPr/>
+        <p:nvPr/>
+      </p:nvGrpSpPr>
+      <p:grpSpPr>
+        <a:xfrm>
+          <a:off x="0" y="0"/>
+          <a:ext cx="0" cy="0"/>
+          <a:chOff x="0" y="0"/>
+          <a:chExt cx="0" cy="0"/>
+        </a:xfrm>
+      </p:grpSpPr>
+      <p:sp>
+        <p:nvSpPr>
+          <p:cNvPr id="3" name="Título 2"/>
+          <p:cNvSpPr>
+            <a:spLocks noGrp="1"/>
+          </p:cNvSpPr>
+          <p:nvPr>
+            <p:ph type="title"/>
+          </p:nvPr>
+        </p:nvSpPr>
+        <p:spPr/>
+        <p:txBody>
+          <a:bodyPr>
+            <a:normAutofit fontScale="90000"/>
+          </a:bodyPr>
+          <a:lstStyle/>
+          <a:p>
+            <a:r>
+              <a:rPr lang="en-US" dirty="0"/>
+              <a:t>Demo: Perform a Demo(</a:t>
+            </a:r>
+            <a:r>
+              <a:rPr lang="en-US" dirty="0" err="1"/>
+              <a:t>nstration</a:t>
+            </a:r>
+            <a:r>
+              <a:rPr lang="en-US" dirty="0"/>
+              <a:t>) of the method using </a:t>
+            </a:r>
+            <a:r>
+              <a:rPr lang="en-US" dirty="0" err="1"/>
+              <a:t>PyOD</a:t>
+            </a:r>
+            <a:endParaRPr lang="pt-BR" dirty="0"/>
+          </a:p>
+        </p:txBody>
+      </p:sp>
+    </p:spTree>
+    <p:extLst>
+      <p:ext uri="{BB962C8B-B14F-4D97-AF65-F5344CB8AC3E}">
+        <p14:creationId xmlns:p14="http://schemas.microsoft.com/office/powerpoint/2010/main" val="3926115087"/>
+      </p:ext>
+    </p:extLst>
+  </p:cSld>
+  <p:clrMapOvr>
+    <a:masterClrMapping/>
+  </p:clrMapOvr>
+  <p:timing>
+    <p:tnLst>
+      <p:par>
+        <p:cTn id="1" dur="indefinite" restart="never" nodeType="tmRoot"/>
+      </p:par>
+    </p:tnLst>
+  </p:timing>
+</p:sld>
+</file>
+
+<file path=ppt/slides/slide23.xml><?xml version="1.0" encoding="utf-8"?>
+<p:sld xmlns:a="http://schemas.openxmlformats.org/drawingml/2006/main" xmlns:r="http://schemas.openxmlformats.org/officeDocument/2006/relationships" xmlns:p="http://schemas.openxmlformats.org/presentationml/2006/main">
+  <p:cSld>
+    <p:spTree>
+      <p:nvGrpSpPr>
+        <p:cNvPr id="1" name=""/>
+        <p:cNvGrpSpPr/>
+        <p:nvPr/>
+      </p:nvGrpSpPr>
+      <p:grpSpPr>
+        <a:xfrm>
+          <a:off x="0" y="0"/>
+          <a:ext cx="0" cy="0"/>
+          <a:chOff x="0" y="0"/>
+          <a:chExt cx="0" cy="0"/>
+        </a:xfrm>
+      </p:grpSpPr>
+      <p:sp>
+        <p:nvSpPr>
+          <p:cNvPr id="3" name="Título 2"/>
+          <p:cNvSpPr>
+            <a:spLocks noGrp="1"/>
+          </p:cNvSpPr>
+          <p:nvPr>
+            <p:ph type="title"/>
+          </p:nvPr>
+        </p:nvSpPr>
+        <p:spPr/>
+        <p:txBody>
+          <a:bodyPr/>
+          <a:lstStyle/>
+          <a:p>
+            <a:r>
               <a:rPr lang="pt-BR" dirty="0" smtClean="0"/>
               <a:t>Onde encontrar o Código</a:t>
             </a:r>
@@ -4128,7 +6849,7 @@
 </p:sld>
 </file>
 
-<file path=ppt/slides/slide11.xml><?xml version="1.0" encoding="utf-8"?>
+<file path=ppt/slides/slide24.xml><?xml version="1.0" encoding="utf-8"?>
 <p:sld xmlns:a="http://schemas.openxmlformats.org/drawingml/2006/main" xmlns:r="http://schemas.openxmlformats.org/officeDocument/2006/relationships" xmlns:p="http://schemas.openxmlformats.org/presentationml/2006/main">
   <p:cSld>
     <p:spTree>
@@ -4225,7 +6946,7 @@
 </p:sld>
 </file>
 
-<file path=ppt/slides/slide12.xml><?xml version="1.0" encoding="utf-8"?>
+<file path=ppt/slides/slide25.xml><?xml version="1.0" encoding="utf-8"?>
 <p:sld xmlns:a="http://schemas.openxmlformats.org/drawingml/2006/main" xmlns:r="http://schemas.openxmlformats.org/officeDocument/2006/relationships" xmlns:p="http://schemas.openxmlformats.org/presentationml/2006/main">
   <p:cSld>
     <p:spTree>
@@ -4261,36 +6982,6 @@
           </a:p>
         </p:txBody>
       </p:sp>
-      <p:pic>
-        <p:nvPicPr>
-          <p:cNvPr id="2" name="Imagem 1"/>
-          <p:cNvPicPr>
-            <a:picLocks noChangeAspect="1"/>
-          </p:cNvPicPr>
-          <p:nvPr/>
-        </p:nvPicPr>
-        <p:blipFill>
-          <a:blip r:embed="rId3">
-            <a:extLst>
-              <a:ext uri="{28A0092B-C50C-407E-A947-70E740481C1C}">
-                <a14:useLocalDpi xmlns:a14="http://schemas.microsoft.com/office/drawing/2010/main" val="0"/>
-              </a:ext>
-            </a:extLst>
-          </a:blip>
-          <a:stretch>
-            <a:fillRect/>
-          </a:stretch>
-        </p:blipFill>
-        <p:spPr>
-          <a:xfrm>
-            <a:off x="0" y="1697583"/>
-            <a:ext cx="9144000" cy="4616131"/>
-          </a:xfrm>
-          <a:prstGeom prst="rect">
-            <a:avLst/>
-          </a:prstGeom>
-        </p:spPr>
-      </p:pic>
     </p:spTree>
     <p:extLst>
       <p:ext uri="{BB962C8B-B14F-4D97-AF65-F5344CB8AC3E}">
@@ -4311,7 +7002,7 @@
 </p:sld>
 </file>
 
-<file path=ppt/slides/slide13.xml><?xml version="1.0" encoding="utf-8"?>
+<file path=ppt/slides/slide26.xml><?xml version="1.0" encoding="utf-8"?>
 <p:sld xmlns:a="http://schemas.openxmlformats.org/drawingml/2006/main" xmlns:r="http://schemas.openxmlformats.org/officeDocument/2006/relationships" xmlns:p="http://schemas.openxmlformats.org/presentationml/2006/main">
   <p:cSld>
     <p:spTree>
@@ -4367,7 +7058,7 @@
 </p:sld>
 </file>
 
-<file path=ppt/slides/slide14.xml><?xml version="1.0" encoding="utf-8"?>
+<file path=ppt/slides/slide27.xml><?xml version="1.0" encoding="utf-8"?>
 <p:sld xmlns:a="http://schemas.openxmlformats.org/drawingml/2006/main" xmlns:r="http://schemas.openxmlformats.org/officeDocument/2006/relationships" xmlns:p="http://schemas.openxmlformats.org/presentationml/2006/main">
   <p:cSld>
     <p:spTree>
@@ -4423,7 +7114,7 @@
 </p:sld>
 </file>
 
-<file path=ppt/slides/slide15.xml><?xml version="1.0" encoding="utf-8"?>
+<file path=ppt/slides/slide28.xml><?xml version="1.0" encoding="utf-8"?>
 <p:sld xmlns:a="http://schemas.openxmlformats.org/drawingml/2006/main" xmlns:r="http://schemas.openxmlformats.org/officeDocument/2006/relationships" xmlns:p="http://schemas.openxmlformats.org/presentationml/2006/main">
   <p:cSld>
     <p:spTree>
@@ -4500,7 +7191,7 @@
 </p:sld>
 </file>
 
-<file path=ppt/slides/slide16.xml><?xml version="1.0" encoding="utf-8"?>
+<file path=ppt/slides/slide29.xml><?xml version="1.0" encoding="utf-8"?>
 <p:sld xmlns:a="http://schemas.openxmlformats.org/drawingml/2006/main" xmlns:r="http://schemas.openxmlformats.org/officeDocument/2006/relationships" xmlns:p="http://schemas.openxmlformats.org/presentationml/2006/main">
   <p:cSld>
     <p:spTree>
@@ -4568,7 +7259,94 @@
 </p:sld>
 </file>
 
-<file path=ppt/slides/slide17.xml><?xml version="1.0" encoding="utf-8"?>
+<file path=ppt/slides/slide3.xml><?xml version="1.0" encoding="utf-8"?>
+<p:sld xmlns:a="http://schemas.openxmlformats.org/drawingml/2006/main" xmlns:r="http://schemas.openxmlformats.org/officeDocument/2006/relationships" xmlns:p="http://schemas.openxmlformats.org/presentationml/2006/main">
+  <p:cSld>
+    <p:spTree>
+      <p:nvGrpSpPr>
+        <p:cNvPr id="1" name=""/>
+        <p:cNvGrpSpPr/>
+        <p:nvPr/>
+      </p:nvGrpSpPr>
+      <p:grpSpPr>
+        <a:xfrm>
+          <a:off x="0" y="0"/>
+          <a:ext cx="0" cy="0"/>
+          <a:chOff x="0" y="0"/>
+          <a:chExt cx="0" cy="0"/>
+        </a:xfrm>
+      </p:grpSpPr>
+      <p:sp>
+        <p:nvSpPr>
+          <p:cNvPr id="2" name="Espaço Reservado para Conteúdo 1"/>
+          <p:cNvSpPr>
+            <a:spLocks noGrp="1"/>
+          </p:cNvSpPr>
+          <p:nvPr>
+            <p:ph idx="1"/>
+          </p:nvPr>
+        </p:nvSpPr>
+        <p:spPr>
+          <a:xfrm>
+            <a:off x="628650" y="2680202"/>
+            <a:ext cx="7886700" cy="1914100"/>
+          </a:xfrm>
+        </p:spPr>
+        <p:txBody>
+          <a:bodyPr/>
+          <a:lstStyle/>
+          <a:p>
+            <a:pPr marL="0" indent="0">
+              <a:buNone/>
+            </a:pPr>
+            <a:endParaRPr lang="pt-BR" dirty="0" smtClean="0"/>
+          </a:p>
+        </p:txBody>
+      </p:sp>
+      <p:sp>
+        <p:nvSpPr>
+          <p:cNvPr id="3" name="Título 2"/>
+          <p:cNvSpPr>
+            <a:spLocks noGrp="1"/>
+          </p:cNvSpPr>
+          <p:nvPr>
+            <p:ph type="title"/>
+          </p:nvPr>
+        </p:nvSpPr>
+        <p:spPr/>
+        <p:txBody>
+          <a:bodyPr/>
+          <a:lstStyle/>
+          <a:p>
+            <a:r>
+              <a:rPr lang="pt-BR" dirty="0" smtClean="0"/>
+              <a:t>Objetivo</a:t>
+            </a:r>
+            <a:endParaRPr lang="pt-BR" dirty="0"/>
+          </a:p>
+        </p:txBody>
+      </p:sp>
+    </p:spTree>
+    <p:extLst>
+      <p:ext uri="{BB962C8B-B14F-4D97-AF65-F5344CB8AC3E}">
+        <p14:creationId xmlns:p14="http://schemas.microsoft.com/office/powerpoint/2010/main" val="3104511195"/>
+      </p:ext>
+    </p:extLst>
+  </p:cSld>
+  <p:clrMapOvr>
+    <a:masterClrMapping/>
+  </p:clrMapOvr>
+  <p:timing>
+    <p:tnLst>
+      <p:par>
+        <p:cTn id="1" dur="indefinite" restart="never" nodeType="tmRoot"/>
+      </p:par>
+    </p:tnLst>
+  </p:timing>
+</p:sld>
+</file>
+
+<file path=ppt/slides/slide30.xml><?xml version="1.0" encoding="utf-8"?>
 <p:sld xmlns:a="http://schemas.openxmlformats.org/drawingml/2006/main" xmlns:r="http://schemas.openxmlformats.org/officeDocument/2006/relationships" xmlns:p="http://schemas.openxmlformats.org/presentationml/2006/main">
   <p:cSld>
     <p:spTree>
@@ -4643,7 +7421,7 @@
 </p:sld>
 </file>
 
-<file path=ppt/slides/slide18.xml><?xml version="1.0" encoding="utf-8"?>
+<file path=ppt/slides/slide31.xml><?xml version="1.0" encoding="utf-8"?>
 <p:sld xmlns:a="http://schemas.openxmlformats.org/drawingml/2006/main" xmlns:r="http://schemas.openxmlformats.org/officeDocument/2006/relationships" xmlns:p="http://schemas.openxmlformats.org/presentationml/2006/main">
   <p:cSld>
     <p:spTree>
@@ -4848,155 +7626,6 @@
     <p:extLst>
       <p:ext uri="{BB962C8B-B14F-4D97-AF65-F5344CB8AC3E}">
         <p14:creationId xmlns:p14="http://schemas.microsoft.com/office/powerpoint/2010/main" val="2178387840"/>
-      </p:ext>
-    </p:extLst>
-  </p:cSld>
-  <p:clrMapOvr>
-    <a:masterClrMapping/>
-  </p:clrMapOvr>
-  <p:timing>
-    <p:tnLst>
-      <p:par>
-        <p:cTn id="1" dur="indefinite" restart="never" nodeType="tmRoot"/>
-      </p:par>
-    </p:tnLst>
-  </p:timing>
-</p:sld>
-</file>
-
-<file path=ppt/slides/slide2.xml><?xml version="1.0" encoding="utf-8"?>
-<p:sld xmlns:a="http://schemas.openxmlformats.org/drawingml/2006/main" xmlns:r="http://schemas.openxmlformats.org/officeDocument/2006/relationships" xmlns:p="http://schemas.openxmlformats.org/presentationml/2006/main">
-  <p:cSld>
-    <p:spTree>
-      <p:nvGrpSpPr>
-        <p:cNvPr id="1" name=""/>
-        <p:cNvGrpSpPr/>
-        <p:nvPr/>
-      </p:nvGrpSpPr>
-      <p:grpSpPr>
-        <a:xfrm>
-          <a:off x="0" y="0"/>
-          <a:ext cx="0" cy="0"/>
-          <a:chOff x="0" y="0"/>
-          <a:chExt cx="0" cy="0"/>
-        </a:xfrm>
-      </p:grpSpPr>
-      <p:sp>
-        <p:nvSpPr>
-          <p:cNvPr id="3" name="Título 2"/>
-          <p:cNvSpPr>
-            <a:spLocks noGrp="1"/>
-          </p:cNvSpPr>
-          <p:nvPr>
-            <p:ph type="title"/>
-          </p:nvPr>
-        </p:nvSpPr>
-        <p:spPr/>
-        <p:txBody>
-          <a:bodyPr>
-            <a:normAutofit/>
-          </a:bodyPr>
-          <a:lstStyle/>
-          <a:p>
-            <a:r>
-              <a:rPr lang="pt-BR" dirty="0" smtClean="0"/>
-              <a:t>Motivação</a:t>
-            </a:r>
-            <a:endParaRPr lang="pt-BR" dirty="0"/>
-          </a:p>
-        </p:txBody>
-      </p:sp>
-    </p:spTree>
-    <p:extLst>
-      <p:ext uri="{BB962C8B-B14F-4D97-AF65-F5344CB8AC3E}">
-        <p14:creationId xmlns:p14="http://schemas.microsoft.com/office/powerpoint/2010/main" val="3864786897"/>
-      </p:ext>
-    </p:extLst>
-  </p:cSld>
-  <p:clrMapOvr>
-    <a:masterClrMapping/>
-  </p:clrMapOvr>
-  <p:timing>
-    <p:tnLst>
-      <p:par>
-        <p:cTn id="1" dur="indefinite" restart="never" nodeType="tmRoot"/>
-      </p:par>
-    </p:tnLst>
-  </p:timing>
-</p:sld>
-</file>
-
-<file path=ppt/slides/slide3.xml><?xml version="1.0" encoding="utf-8"?>
-<p:sld xmlns:a="http://schemas.openxmlformats.org/drawingml/2006/main" xmlns:r="http://schemas.openxmlformats.org/officeDocument/2006/relationships" xmlns:p="http://schemas.openxmlformats.org/presentationml/2006/main">
-  <p:cSld>
-    <p:spTree>
-      <p:nvGrpSpPr>
-        <p:cNvPr id="1" name=""/>
-        <p:cNvGrpSpPr/>
-        <p:nvPr/>
-      </p:nvGrpSpPr>
-      <p:grpSpPr>
-        <a:xfrm>
-          <a:off x="0" y="0"/>
-          <a:ext cx="0" cy="0"/>
-          <a:chOff x="0" y="0"/>
-          <a:chExt cx="0" cy="0"/>
-        </a:xfrm>
-      </p:grpSpPr>
-      <p:sp>
-        <p:nvSpPr>
-          <p:cNvPr id="2" name="Espaço Reservado para Conteúdo 1"/>
-          <p:cNvSpPr>
-            <a:spLocks noGrp="1"/>
-          </p:cNvSpPr>
-          <p:nvPr>
-            <p:ph idx="1"/>
-          </p:nvPr>
-        </p:nvSpPr>
-        <p:spPr>
-          <a:xfrm>
-            <a:off x="628650" y="2680202"/>
-            <a:ext cx="7886700" cy="1914100"/>
-          </a:xfrm>
-        </p:spPr>
-        <p:txBody>
-          <a:bodyPr/>
-          <a:lstStyle/>
-          <a:p>
-            <a:pPr marL="0" indent="0">
-              <a:buNone/>
-            </a:pPr>
-            <a:endParaRPr lang="pt-BR" dirty="0" smtClean="0"/>
-          </a:p>
-        </p:txBody>
-      </p:sp>
-      <p:sp>
-        <p:nvSpPr>
-          <p:cNvPr id="3" name="Título 2"/>
-          <p:cNvSpPr>
-            <a:spLocks noGrp="1"/>
-          </p:cNvSpPr>
-          <p:nvPr>
-            <p:ph type="title"/>
-          </p:nvPr>
-        </p:nvSpPr>
-        <p:spPr/>
-        <p:txBody>
-          <a:bodyPr/>
-          <a:lstStyle/>
-          <a:p>
-            <a:r>
-              <a:rPr lang="pt-BR" dirty="0" smtClean="0"/>
-              <a:t>Objetivo</a:t>
-            </a:r>
-            <a:endParaRPr lang="pt-BR" dirty="0"/>
-          </a:p>
-        </p:txBody>
-      </p:sp>
-    </p:spTree>
-    <p:extLst>
-      <p:ext uri="{BB962C8B-B14F-4D97-AF65-F5344CB8AC3E}">
-        <p14:creationId xmlns:p14="http://schemas.microsoft.com/office/powerpoint/2010/main" val="3104511195"/>
       </p:ext>
     </p:extLst>
   </p:cSld>
@@ -5119,51 +7748,97 @@
       </p:grpSpPr>
       <p:sp>
         <p:nvSpPr>
-          <p:cNvPr id="2" name="Espaço Reservado para Conteúdo 1"/>
-          <p:cNvSpPr>
-            <a:spLocks noGrp="1"/>
-          </p:cNvSpPr>
-          <p:nvPr>
-            <p:ph idx="1"/>
-          </p:nvPr>
-        </p:nvSpPr>
+          <p:cNvPr id="3" name="Título 2"/>
+          <p:cNvSpPr>
+            <a:spLocks noGrp="1"/>
+          </p:cNvSpPr>
+          <p:nvPr>
+            <p:ph type="title"/>
+          </p:nvPr>
+        </p:nvSpPr>
+        <p:spPr/>
+        <p:txBody>
+          <a:bodyPr/>
+          <a:lstStyle/>
+          <a:p>
+            <a:r>
+              <a:rPr lang="pt-BR" dirty="0" smtClean="0"/>
+              <a:t>Abordagem (Método)</a:t>
+            </a:r>
+            <a:endParaRPr lang="pt-BR" dirty="0"/>
+          </a:p>
+        </p:txBody>
+      </p:sp>
+      <p:pic>
+        <p:nvPicPr>
+          <p:cNvPr id="4" name="Imagem 3"/>
+          <p:cNvPicPr>
+            <a:picLocks noChangeAspect="1"/>
+          </p:cNvPicPr>
+          <p:nvPr/>
+        </p:nvPicPr>
+        <p:blipFill>
+          <a:blip r:embed="rId2">
+            <a:extLst>
+              <a:ext uri="{28A0092B-C50C-407E-A947-70E740481C1C}">
+                <a14:useLocalDpi xmlns:a14="http://schemas.microsoft.com/office/drawing/2010/main" val="0"/>
+              </a:ext>
+            </a:extLst>
+          </a:blip>
+          <a:stretch>
+            <a:fillRect/>
+          </a:stretch>
+        </p:blipFill>
         <p:spPr>
           <a:xfrm>
-            <a:off x="628650" y="2680202"/>
-            <a:ext cx="7886700" cy="1914100"/>
+            <a:off x="354227" y="2562850"/>
+            <a:ext cx="8229600" cy="4154518"/>
           </a:xfrm>
+          <a:prstGeom prst="rect">
+            <a:avLst/>
+          </a:prstGeom>
         </p:spPr>
-        <p:txBody>
-          <a:bodyPr/>
-          <a:lstStyle/>
-          <a:p>
-            <a:pPr marL="0" indent="0">
-              <a:buNone/>
-            </a:pPr>
-            <a:endParaRPr lang="pt-BR" dirty="0" smtClean="0"/>
-          </a:p>
-        </p:txBody>
-      </p:sp>
-      <p:sp>
-        <p:nvSpPr>
-          <p:cNvPr id="3" name="Título 2"/>
-          <p:cNvSpPr>
-            <a:spLocks noGrp="1"/>
-          </p:cNvSpPr>
-          <p:nvPr>
-            <p:ph type="title"/>
-          </p:nvPr>
-        </p:nvSpPr>
-        <p:spPr/>
-        <p:txBody>
-          <a:bodyPr/>
-          <a:lstStyle/>
-          <a:p>
-            <a:r>
-              <a:rPr lang="pt-BR" dirty="0" smtClean="0"/>
-              <a:t>Abordagem (Método)</a:t>
-            </a:r>
-            <a:endParaRPr lang="pt-BR" dirty="0"/>
+      </p:pic>
+      <p:sp>
+        <p:nvSpPr>
+          <p:cNvPr id="5" name="CaixaDeTexto 4"/>
+          <p:cNvSpPr txBox="1"/>
+          <p:nvPr/>
+        </p:nvSpPr>
+        <p:spPr>
+          <a:xfrm>
+            <a:off x="2784390" y="1861752"/>
+            <a:ext cx="3220994" cy="523220"/>
+          </a:xfrm>
+          <a:prstGeom prst="rect">
+            <a:avLst/>
+          </a:prstGeom>
+        </p:spPr>
+        <p:style>
+          <a:lnRef idx="2">
+            <a:schemeClr val="accent2"/>
+          </a:lnRef>
+          <a:fillRef idx="1">
+            <a:schemeClr val="lt1"/>
+          </a:fillRef>
+          <a:effectRef idx="0">
+            <a:schemeClr val="accent2"/>
+          </a:effectRef>
+          <a:fontRef idx="minor">
+            <a:schemeClr val="dk1"/>
+          </a:fontRef>
+        </p:style>
+        <p:txBody>
+          <a:bodyPr wrap="square" rtlCol="0">
+            <a:spAutoFit/>
+          </a:bodyPr>
+          <a:lstStyle/>
+          <a:p>
+            <a:r>
+              <a:rPr lang="pt-BR" sz="2800" dirty="0" smtClean="0"/>
+              <a:t>Design do Algoritmo</a:t>
+            </a:r>
+            <a:endParaRPr lang="pt-BR" sz="2800" dirty="0"/>
           </a:p>
         </p:txBody>
       </p:sp>
@@ -5206,58 +7881,63 @@
       </p:grpSpPr>
       <p:sp>
         <p:nvSpPr>
-          <p:cNvPr id="2" name="Espaço Reservado para Conteúdo 1"/>
-          <p:cNvSpPr>
-            <a:spLocks noGrp="1"/>
-          </p:cNvSpPr>
-          <p:nvPr>
-            <p:ph idx="1"/>
-          </p:nvPr>
-        </p:nvSpPr>
+          <p:cNvPr id="3" name="Título 2"/>
+          <p:cNvSpPr>
+            <a:spLocks noGrp="1"/>
+          </p:cNvSpPr>
+          <p:nvPr>
+            <p:ph type="title"/>
+          </p:nvPr>
+        </p:nvSpPr>
+        <p:spPr/>
+        <p:txBody>
+          <a:bodyPr>
+            <a:normAutofit fontScale="90000"/>
+          </a:bodyPr>
+          <a:lstStyle/>
+          <a:p>
+            <a:r>
+              <a:rPr lang="pt-BR" dirty="0" smtClean="0"/>
+              <a:t>Fase 1: Representação do Aprendizado não-supervisionado</a:t>
+            </a:r>
+            <a:endParaRPr lang="pt-BR" dirty="0"/>
+          </a:p>
+        </p:txBody>
+      </p:sp>
+      <p:pic>
+        <p:nvPicPr>
+          <p:cNvPr id="2" name="Imagem 1"/>
+          <p:cNvPicPr>
+            <a:picLocks noChangeAspect="1"/>
+          </p:cNvPicPr>
+          <p:nvPr/>
+        </p:nvPicPr>
+        <p:blipFill>
+          <a:blip r:embed="rId3">
+            <a:extLst>
+              <a:ext uri="{28A0092B-C50C-407E-A947-70E740481C1C}">
+                <a14:useLocalDpi xmlns:a14="http://schemas.microsoft.com/office/drawing/2010/main" val="0"/>
+              </a:ext>
+            </a:extLst>
+          </a:blip>
+          <a:stretch>
+            <a:fillRect/>
+          </a:stretch>
+        </p:blipFill>
         <p:spPr>
           <a:xfrm>
-            <a:off x="628650" y="2680202"/>
-            <a:ext cx="7886700" cy="1914100"/>
+            <a:off x="2557728" y="1705791"/>
+            <a:ext cx="4028543" cy="4769873"/>
           </a:xfrm>
+          <a:prstGeom prst="rect">
+            <a:avLst/>
+          </a:prstGeom>
         </p:spPr>
-        <p:txBody>
-          <a:bodyPr/>
-          <a:lstStyle/>
-          <a:p>
-            <a:pPr marL="0" indent="0">
-              <a:buNone/>
-            </a:pPr>
-            <a:endParaRPr lang="pt-BR" dirty="0" smtClean="0"/>
-          </a:p>
-        </p:txBody>
-      </p:sp>
-      <p:sp>
-        <p:nvSpPr>
-          <p:cNvPr id="3" name="Título 2"/>
-          <p:cNvSpPr>
-            <a:spLocks noGrp="1"/>
-          </p:cNvSpPr>
-          <p:nvPr>
-            <p:ph type="title"/>
-          </p:nvPr>
-        </p:nvSpPr>
-        <p:spPr/>
-        <p:txBody>
-          <a:bodyPr/>
-          <a:lstStyle/>
-          <a:p>
-            <a:r>
-              <a:rPr lang="pt-BR" dirty="0" smtClean="0"/>
-              <a:t>Implementação</a:t>
-            </a:r>
-            <a:endParaRPr lang="pt-BR" dirty="0"/>
-          </a:p>
-        </p:txBody>
-      </p:sp>
+      </p:pic>
     </p:spTree>
     <p:extLst>
       <p:ext uri="{BB962C8B-B14F-4D97-AF65-F5344CB8AC3E}">
-        <p14:creationId xmlns:p14="http://schemas.microsoft.com/office/powerpoint/2010/main" val="1607534576"/>
+        <p14:creationId xmlns:p14="http://schemas.microsoft.com/office/powerpoint/2010/main" val="4148836829"/>
       </p:ext>
     </p:extLst>
   </p:cSld>
@@ -5293,58 +7973,387 @@
       </p:grpSpPr>
       <p:sp>
         <p:nvSpPr>
-          <p:cNvPr id="2" name="Espaço Reservado para Conteúdo 1"/>
-          <p:cNvSpPr>
-            <a:spLocks noGrp="1"/>
-          </p:cNvSpPr>
-          <p:nvPr>
-            <p:ph idx="1"/>
-          </p:nvPr>
+          <p:cNvPr id="3" name="Título 2"/>
+          <p:cNvSpPr>
+            <a:spLocks noGrp="1"/>
+          </p:cNvSpPr>
+          <p:nvPr>
+            <p:ph type="title"/>
+          </p:nvPr>
+        </p:nvSpPr>
+        <p:spPr/>
+        <p:txBody>
+          <a:bodyPr>
+            <a:normAutofit fontScale="90000"/>
+          </a:bodyPr>
+          <a:lstStyle/>
+          <a:p>
+            <a:r>
+              <a:rPr lang="pt-BR" dirty="0"/>
+              <a:t>Fase 1: Representação do Aprendizado não-supervisionado</a:t>
+            </a:r>
+            <a:endParaRPr lang="pt-BR" dirty="0"/>
+          </a:p>
+        </p:txBody>
+      </p:sp>
+      <p:sp>
+        <p:nvSpPr>
+          <p:cNvPr id="4" name="CaixaDeTexto 3"/>
+          <p:cNvSpPr txBox="1"/>
+          <p:nvPr/>
         </p:nvSpPr>
         <p:spPr>
           <a:xfrm>
-            <a:off x="628650" y="2680202"/>
-            <a:ext cx="7886700" cy="1914100"/>
+            <a:off x="716691" y="1911178"/>
+            <a:ext cx="7710617" cy="646331"/>
           </a:xfrm>
+          <a:prstGeom prst="rect">
+            <a:avLst/>
+          </a:prstGeom>
+          <a:noFill/>
         </p:spPr>
         <p:txBody>
-          <a:bodyPr/>
-          <a:lstStyle/>
-          <a:p>
-            <a:pPr marL="0" indent="0">
-              <a:buNone/>
-            </a:pPr>
-            <a:endParaRPr lang="pt-BR" dirty="0" smtClean="0"/>
-          </a:p>
-        </p:txBody>
-      </p:sp>
-      <p:sp>
-        <p:nvSpPr>
-          <p:cNvPr id="3" name="Título 2"/>
-          <p:cNvSpPr>
-            <a:spLocks noGrp="1"/>
-          </p:cNvSpPr>
-          <p:nvPr>
-            <p:ph type="title"/>
-          </p:nvPr>
-        </p:nvSpPr>
-        <p:spPr/>
-        <p:txBody>
-          <a:bodyPr/>
-          <a:lstStyle/>
-          <a:p>
+          <a:bodyPr wrap="square" rtlCol="0">
+            <a:spAutoFit/>
+          </a:bodyPr>
+          <a:lstStyle/>
+          <a:p>
+            <a:r>
+              <a:rPr lang="pt-BR" dirty="0" err="1"/>
+              <a:t>U</a:t>
+            </a:r>
+            <a:r>
+              <a:rPr lang="pt-BR" dirty="0" err="1" smtClean="0"/>
+              <a:t>nsupervised</a:t>
+            </a:r>
             <a:r>
               <a:rPr lang="pt-BR" dirty="0" smtClean="0"/>
-              <a:t>Resultados</a:t>
+              <a:t> </a:t>
+            </a:r>
+            <a:r>
+              <a:rPr lang="pt-BR" dirty="0" err="1" smtClean="0"/>
+              <a:t>outlier</a:t>
+            </a:r>
+            <a:r>
+              <a:rPr lang="pt-BR" dirty="0" smtClean="0"/>
+              <a:t> scores podem ser vistos como forma de representação dos dados originais;</a:t>
             </a:r>
             <a:endParaRPr lang="pt-BR" dirty="0"/>
           </a:p>
         </p:txBody>
       </p:sp>
+      <p:pic>
+        <p:nvPicPr>
+          <p:cNvPr id="5" name="Imagem 4"/>
+          <p:cNvPicPr>
+            <a:picLocks noChangeAspect="1"/>
+          </p:cNvPicPr>
+          <p:nvPr/>
+        </p:nvPicPr>
+        <p:blipFill>
+          <a:blip r:embed="rId3">
+            <a:extLst>
+              <a:ext uri="{28A0092B-C50C-407E-A947-70E740481C1C}">
+                <a14:useLocalDpi xmlns:a14="http://schemas.microsoft.com/office/drawing/2010/main" val="0"/>
+              </a:ext>
+            </a:extLst>
+          </a:blip>
+          <a:stretch>
+            <a:fillRect/>
+          </a:stretch>
+        </p:blipFill>
+        <p:spPr>
+          <a:xfrm>
+            <a:off x="2774676" y="2986965"/>
+            <a:ext cx="1097623" cy="430440"/>
+          </a:xfrm>
+          <a:prstGeom prst="rect">
+            <a:avLst/>
+          </a:prstGeom>
+        </p:spPr>
+      </p:pic>
+      <p:sp>
+        <p:nvSpPr>
+          <p:cNvPr id="6" name="CaixaDeTexto 5"/>
+          <p:cNvSpPr txBox="1"/>
+          <p:nvPr/>
+        </p:nvSpPr>
+        <p:spPr>
+          <a:xfrm>
+            <a:off x="716691" y="2986965"/>
+            <a:ext cx="2306594" cy="369332"/>
+          </a:xfrm>
+          <a:prstGeom prst="rect">
+            <a:avLst/>
+          </a:prstGeom>
+          <a:noFill/>
+        </p:spPr>
+        <p:txBody>
+          <a:bodyPr wrap="square" rtlCol="0">
+            <a:spAutoFit/>
+          </a:bodyPr>
+          <a:lstStyle/>
+          <a:p>
+            <a:r>
+              <a:rPr lang="pt-BR" dirty="0" smtClean="0"/>
+              <a:t>Dados Originais:</a:t>
+            </a:r>
+            <a:endParaRPr lang="pt-BR" dirty="0"/>
+          </a:p>
+        </p:txBody>
+      </p:sp>
+      <p:sp>
+        <p:nvSpPr>
+          <p:cNvPr id="7" name="CaixaDeTexto 6"/>
+          <p:cNvSpPr txBox="1"/>
+          <p:nvPr/>
+        </p:nvSpPr>
+        <p:spPr>
+          <a:xfrm>
+            <a:off x="716691" y="3718991"/>
+            <a:ext cx="6763265" cy="646331"/>
+          </a:xfrm>
+          <a:prstGeom prst="rect">
+            <a:avLst/>
+          </a:prstGeom>
+          <a:noFill/>
+        </p:spPr>
+        <p:txBody>
+          <a:bodyPr wrap="square" rtlCol="0">
+            <a:spAutoFit/>
+          </a:bodyPr>
+          <a:lstStyle/>
+          <a:p>
+            <a:r>
+              <a:rPr lang="pt-BR" dirty="0" smtClean="0"/>
+              <a:t>Função que retorna vetor de </a:t>
+            </a:r>
+            <a:r>
+              <a:rPr lang="pt-BR" dirty="0" err="1" smtClean="0"/>
+              <a:t>scoring</a:t>
+            </a:r>
+            <a:r>
+              <a:rPr lang="pt-BR" dirty="0"/>
+              <a:t> </a:t>
+            </a:r>
+            <a:r>
+              <a:rPr lang="pt-BR" dirty="0" smtClean="0"/>
+              <a:t>no </a:t>
+            </a:r>
+            <a:r>
+              <a:rPr lang="pt-BR" dirty="0" err="1" smtClean="0"/>
+              <a:t>dataset</a:t>
+            </a:r>
+            <a:r>
+              <a:rPr lang="pt-BR" dirty="0" smtClean="0"/>
+              <a:t> X,  chamado de </a:t>
+            </a:r>
+            <a:r>
+              <a:rPr lang="pt-BR" dirty="0" err="1" smtClean="0"/>
+              <a:t>transformed</a:t>
+            </a:r>
+            <a:r>
+              <a:rPr lang="pt-BR" dirty="0" smtClean="0"/>
+              <a:t> </a:t>
+            </a:r>
+            <a:r>
+              <a:rPr lang="pt-BR" dirty="0" err="1" smtClean="0"/>
+              <a:t>outlier</a:t>
+            </a:r>
+            <a:r>
+              <a:rPr lang="pt-BR" dirty="0" smtClean="0"/>
+              <a:t> scores (TOS):</a:t>
+            </a:r>
+            <a:endParaRPr lang="pt-BR" dirty="0"/>
+          </a:p>
+        </p:txBody>
+      </p:sp>
+      <p:pic>
+        <p:nvPicPr>
+          <p:cNvPr id="8" name="Imagem 7"/>
+          <p:cNvPicPr>
+            <a:picLocks noChangeAspect="1"/>
+          </p:cNvPicPr>
+          <p:nvPr/>
+        </p:nvPicPr>
+        <p:blipFill>
+          <a:blip r:embed="rId4">
+            <a:extLst>
+              <a:ext uri="{28A0092B-C50C-407E-A947-70E740481C1C}">
+                <a14:useLocalDpi xmlns:a14="http://schemas.microsoft.com/office/drawing/2010/main" val="0"/>
+              </a:ext>
+            </a:extLst>
+          </a:blip>
+          <a:stretch>
+            <a:fillRect/>
+          </a:stretch>
+        </p:blipFill>
+        <p:spPr>
+          <a:xfrm>
+            <a:off x="7073056" y="3855450"/>
+            <a:ext cx="1242168" cy="373412"/>
+          </a:xfrm>
+          <a:prstGeom prst="rect">
+            <a:avLst/>
+          </a:prstGeom>
+        </p:spPr>
+      </p:pic>
+      <p:sp>
+        <p:nvSpPr>
+          <p:cNvPr id="9" name="CaixaDeTexto 8"/>
+          <p:cNvSpPr txBox="1"/>
+          <p:nvPr/>
+        </p:nvSpPr>
+        <p:spPr>
+          <a:xfrm>
+            <a:off x="716691" y="4823873"/>
+            <a:ext cx="6626469" cy="369332"/>
+          </a:xfrm>
+          <a:prstGeom prst="rect">
+            <a:avLst/>
+          </a:prstGeom>
+          <a:noFill/>
+        </p:spPr>
+        <p:txBody>
+          <a:bodyPr wrap="square" rtlCol="0">
+            <a:spAutoFit/>
+          </a:bodyPr>
+          <a:lstStyle/>
+          <a:p>
+            <a:r>
+              <a:rPr lang="pt-BR" dirty="0" smtClean="0"/>
+              <a:t>Matriz de Transformação combinando k funções de </a:t>
+            </a:r>
+            <a:r>
+              <a:rPr lang="pt-BR" dirty="0" err="1" smtClean="0"/>
+              <a:t>outlier</a:t>
+            </a:r>
+            <a:r>
+              <a:rPr lang="pt-BR" dirty="0" smtClean="0"/>
+              <a:t> </a:t>
+            </a:r>
+            <a:r>
+              <a:rPr lang="pt-BR" dirty="0" err="1" smtClean="0"/>
+              <a:t>scoring</a:t>
+            </a:r>
+            <a:r>
+              <a:rPr lang="pt-BR" dirty="0" smtClean="0"/>
+              <a:t>:</a:t>
+            </a:r>
+            <a:endParaRPr lang="pt-BR" dirty="0"/>
+          </a:p>
+        </p:txBody>
+      </p:sp>
+      <p:pic>
+        <p:nvPicPr>
+          <p:cNvPr id="10" name="Imagem 9"/>
+          <p:cNvPicPr>
+            <a:picLocks noChangeAspect="1"/>
+          </p:cNvPicPr>
+          <p:nvPr/>
+        </p:nvPicPr>
+        <p:blipFill>
+          <a:blip r:embed="rId5">
+            <a:extLst>
+              <a:ext uri="{28A0092B-C50C-407E-A947-70E740481C1C}">
+                <a14:useLocalDpi xmlns:a14="http://schemas.microsoft.com/office/drawing/2010/main" val="0"/>
+              </a:ext>
+            </a:extLst>
+          </a:blip>
+          <a:stretch>
+            <a:fillRect/>
+          </a:stretch>
+        </p:blipFill>
+        <p:spPr>
+          <a:xfrm>
+            <a:off x="7190131" y="4897316"/>
+            <a:ext cx="1386960" cy="304826"/>
+          </a:xfrm>
+          <a:prstGeom prst="rect">
+            <a:avLst/>
+          </a:prstGeom>
+        </p:spPr>
+      </p:pic>
+      <p:sp>
+        <p:nvSpPr>
+          <p:cNvPr id="11" name="CaixaDeTexto 10"/>
+          <p:cNvSpPr txBox="1"/>
+          <p:nvPr/>
+        </p:nvSpPr>
+        <p:spPr>
+          <a:xfrm>
+            <a:off x="716691" y="5651756"/>
+            <a:ext cx="4950941" cy="369332"/>
+          </a:xfrm>
+          <a:prstGeom prst="rect">
+            <a:avLst/>
+          </a:prstGeom>
+          <a:noFill/>
+        </p:spPr>
+        <p:txBody>
+          <a:bodyPr wrap="square" rtlCol="0">
+            <a:spAutoFit/>
+          </a:bodyPr>
+          <a:lstStyle/>
+          <a:p>
+            <a:r>
+              <a:rPr lang="pt-BR" dirty="0" smtClean="0"/>
+              <a:t>Matriz de </a:t>
+            </a:r>
+            <a:r>
+              <a:rPr lang="pt-BR" dirty="0" err="1" smtClean="0"/>
+              <a:t>Outlier</a:t>
+            </a:r>
+            <a:r>
+              <a:rPr lang="pt-BR" dirty="0" smtClean="0"/>
+              <a:t> </a:t>
+            </a:r>
+            <a:r>
+              <a:rPr lang="pt-BR" dirty="0" err="1" smtClean="0"/>
+              <a:t>Scoring</a:t>
+            </a:r>
+            <a:r>
+              <a:rPr lang="pt-BR" dirty="0" smtClean="0"/>
+              <a:t>:</a:t>
+            </a:r>
+            <a:endParaRPr lang="pt-BR" dirty="0"/>
+          </a:p>
+        </p:txBody>
+      </p:sp>
+      <p:pic>
+        <p:nvPicPr>
+          <p:cNvPr id="12" name="Imagem 11"/>
+          <p:cNvPicPr>
+            <a:picLocks noChangeAspect="1"/>
+          </p:cNvPicPr>
+          <p:nvPr/>
+        </p:nvPicPr>
+        <p:blipFill>
+          <a:blip r:embed="rId6">
+            <a:extLst>
+              <a:ext uri="{28A0092B-C50C-407E-A947-70E740481C1C}">
+                <a14:useLocalDpi xmlns:a14="http://schemas.microsoft.com/office/drawing/2010/main" val="0"/>
+              </a:ext>
+            </a:extLst>
+          </a:blip>
+          <a:stretch>
+            <a:fillRect/>
+          </a:stretch>
+        </p:blipFill>
+        <p:spPr>
+          <a:xfrm>
+            <a:off x="3420207" y="5651756"/>
+            <a:ext cx="3292125" cy="472481"/>
+          </a:xfrm>
+          <a:prstGeom prst="rect">
+            <a:avLst/>
+          </a:prstGeom>
+        </p:spPr>
+      </p:pic>
     </p:spTree>
     <p:extLst>
       <p:ext uri="{BB962C8B-B14F-4D97-AF65-F5344CB8AC3E}">
-        <p14:creationId xmlns:p14="http://schemas.microsoft.com/office/powerpoint/2010/main" val="2931453190"/>
+        <p14:creationId xmlns:p14="http://schemas.microsoft.com/office/powerpoint/2010/main" val="2709266738"/>
       </p:ext>
     </p:extLst>
   </p:cSld>
@@ -5380,49 +8389,144 @@
       </p:grpSpPr>
       <p:sp>
         <p:nvSpPr>
-          <p:cNvPr id="2" name="Espaço Reservado para Conteúdo 1"/>
-          <p:cNvSpPr>
-            <a:spLocks noGrp="1"/>
-          </p:cNvSpPr>
-          <p:nvPr>
-            <p:ph idx="1"/>
-          </p:nvPr>
+          <p:cNvPr id="3" name="Título 2"/>
+          <p:cNvSpPr>
+            <a:spLocks noGrp="1"/>
+          </p:cNvSpPr>
+          <p:nvPr>
+            <p:ph type="title"/>
+          </p:nvPr>
+        </p:nvSpPr>
+        <p:spPr/>
+        <p:txBody>
+          <a:bodyPr>
+            <a:normAutofit fontScale="90000"/>
+          </a:bodyPr>
+          <a:lstStyle/>
+          <a:p>
+            <a:r>
+              <a:rPr lang="pt-BR" dirty="0"/>
+              <a:t>Fase 1: Representação do Aprendizado não-supervisionado</a:t>
+            </a:r>
+            <a:endParaRPr lang="pt-BR" dirty="0"/>
+          </a:p>
+        </p:txBody>
+      </p:sp>
+      <p:sp>
+        <p:nvSpPr>
+          <p:cNvPr id="2" name="CaixaDeTexto 1"/>
+          <p:cNvSpPr txBox="1"/>
+          <p:nvPr/>
         </p:nvSpPr>
         <p:spPr>
           <a:xfrm>
-            <a:off x="628650" y="2680202"/>
-            <a:ext cx="7886700" cy="1914100"/>
+            <a:off x="790831" y="2001795"/>
+            <a:ext cx="4020065" cy="369332"/>
           </a:xfrm>
+          <a:prstGeom prst="rect">
+            <a:avLst/>
+          </a:prstGeom>
+          <a:noFill/>
         </p:spPr>
         <p:txBody>
-          <a:bodyPr/>
-          <a:lstStyle/>
-          <a:p>
-            <a:pPr marL="0" indent="0">
-              <a:buNone/>
-            </a:pPr>
-            <a:endParaRPr lang="pt-BR" dirty="0" smtClean="0"/>
-          </a:p>
-        </p:txBody>
-      </p:sp>
-      <p:sp>
-        <p:nvSpPr>
-          <p:cNvPr id="3" name="Título 2"/>
-          <p:cNvSpPr>
-            <a:spLocks noGrp="1"/>
-          </p:cNvSpPr>
-          <p:nvPr>
-            <p:ph type="title"/>
-          </p:nvPr>
-        </p:nvSpPr>
-        <p:spPr/>
-        <p:txBody>
-          <a:bodyPr/>
-          <a:lstStyle/>
-          <a:p>
-            <a:r>
-              <a:rPr lang="pt-BR" dirty="0" err="1"/>
-              <a:t>Takeaways</a:t>
+          <a:bodyPr wrap="square" rtlCol="0">
+            <a:spAutoFit/>
+          </a:bodyPr>
+          <a:lstStyle/>
+          <a:p>
+            <a:r>
+              <a:rPr lang="pt-BR" dirty="0" smtClean="0"/>
+              <a:t>Trade-off entre Diversidade X Acurácia</a:t>
+            </a:r>
+            <a:endParaRPr lang="pt-BR" dirty="0"/>
+          </a:p>
+        </p:txBody>
+      </p:sp>
+      <p:sp>
+        <p:nvSpPr>
+          <p:cNvPr id="4" name="CaixaDeTexto 3"/>
+          <p:cNvSpPr txBox="1"/>
+          <p:nvPr/>
+        </p:nvSpPr>
+        <p:spPr>
+          <a:xfrm>
+            <a:off x="790831" y="2733589"/>
+            <a:ext cx="8122510" cy="646331"/>
+          </a:xfrm>
+          <a:prstGeom prst="rect">
+            <a:avLst/>
+          </a:prstGeom>
+          <a:noFill/>
+        </p:spPr>
+        <p:txBody>
+          <a:bodyPr wrap="square" rtlCol="0">
+            <a:spAutoFit/>
+          </a:bodyPr>
+          <a:lstStyle/>
+          <a:p>
+            <a:r>
+              <a:rPr lang="pt-BR" dirty="0" smtClean="0"/>
+              <a:t>Utilizar detectores distintos melhoram a diversidade, mas com os risco de degradar a capacidade de predição</a:t>
+            </a:r>
+            <a:endParaRPr lang="pt-BR" dirty="0"/>
+          </a:p>
+        </p:txBody>
+      </p:sp>
+      <p:sp>
+        <p:nvSpPr>
+          <p:cNvPr id="5" name="CaixaDeTexto 4"/>
+          <p:cNvSpPr txBox="1"/>
+          <p:nvPr/>
+        </p:nvSpPr>
+        <p:spPr>
+          <a:xfrm>
+            <a:off x="790829" y="3742382"/>
+            <a:ext cx="7241060" cy="646331"/>
+          </a:xfrm>
+          <a:prstGeom prst="rect">
+            <a:avLst/>
+          </a:prstGeom>
+          <a:noFill/>
+        </p:spPr>
+        <p:txBody>
+          <a:bodyPr wrap="square" rtlCol="0">
+            <a:spAutoFit/>
+          </a:bodyPr>
+          <a:lstStyle/>
+          <a:p>
+            <a:r>
+              <a:rPr lang="pt-BR" dirty="0" smtClean="0"/>
+              <a:t>Portanto um equilíbrio entre diversidade e acurácia deve ser mantido para se conseguir melhores resultados</a:t>
+            </a:r>
+            <a:endParaRPr lang="pt-BR" dirty="0"/>
+          </a:p>
+        </p:txBody>
+      </p:sp>
+      <p:sp>
+        <p:nvSpPr>
+          <p:cNvPr id="6" name="CaixaDeTexto 5"/>
+          <p:cNvSpPr txBox="1"/>
+          <p:nvPr/>
+        </p:nvSpPr>
+        <p:spPr>
+          <a:xfrm>
+            <a:off x="782593" y="4934465"/>
+            <a:ext cx="8089560" cy="646331"/>
+          </a:xfrm>
+          <a:prstGeom prst="rect">
+            <a:avLst/>
+          </a:prstGeom>
+          <a:noFill/>
+        </p:spPr>
+        <p:txBody>
+          <a:bodyPr wrap="square" rtlCol="0">
+            <a:spAutoFit/>
+          </a:bodyPr>
+          <a:lstStyle/>
+          <a:p>
+            <a:r>
+              <a:rPr lang="pt-BR" dirty="0" smtClean="0"/>
+              <a:t>Neste estudo, diferentes tipos de métodos não-supervisionados foram utilizados e seus parâmetros trocados para gerar uma maior variação</a:t>
             </a:r>
             <a:endParaRPr lang="pt-BR" dirty="0"/>
           </a:p>
@@ -5431,7 +8535,7 @@
     </p:spTree>
     <p:extLst>
       <p:ext uri="{BB962C8B-B14F-4D97-AF65-F5344CB8AC3E}">
-        <p14:creationId xmlns:p14="http://schemas.microsoft.com/office/powerpoint/2010/main" val="4259043873"/>
+        <p14:creationId xmlns:p14="http://schemas.microsoft.com/office/powerpoint/2010/main" val="285215467"/>
       </p:ext>
     </p:extLst>
   </p:cSld>
@@ -5477,35 +8581,51 @@
         </p:nvSpPr>
         <p:spPr/>
         <p:txBody>
-          <a:bodyPr>
-            <a:normAutofit fontScale="90000"/>
-          </a:bodyPr>
-          <a:lstStyle/>
-          <a:p>
-            <a:r>
-              <a:rPr lang="en-US" dirty="0"/>
-              <a:t>Demo: Perform a Demo(</a:t>
-            </a:r>
-            <a:r>
-              <a:rPr lang="en-US" dirty="0" err="1"/>
-              <a:t>nstration</a:t>
-            </a:r>
-            <a:r>
-              <a:rPr lang="en-US" dirty="0"/>
-              <a:t>) of the method using </a:t>
-            </a:r>
-            <a:r>
-              <a:rPr lang="en-US" dirty="0" err="1"/>
-              <a:t>PyOD</a:t>
+          <a:bodyPr/>
+          <a:lstStyle/>
+          <a:p>
+            <a:r>
+              <a:rPr lang="pt-BR" dirty="0" smtClean="0"/>
+              <a:t>Fase 2: Seleção TOS</a:t>
             </a:r>
             <a:endParaRPr lang="pt-BR" dirty="0"/>
           </a:p>
         </p:txBody>
       </p:sp>
+      <p:pic>
+        <p:nvPicPr>
+          <p:cNvPr id="2" name="Imagem 1"/>
+          <p:cNvPicPr>
+            <a:picLocks noChangeAspect="1"/>
+          </p:cNvPicPr>
+          <p:nvPr/>
+        </p:nvPicPr>
+        <p:blipFill>
+          <a:blip r:embed="rId3">
+            <a:extLst>
+              <a:ext uri="{28A0092B-C50C-407E-A947-70E740481C1C}">
+                <a14:useLocalDpi xmlns:a14="http://schemas.microsoft.com/office/drawing/2010/main" val="0"/>
+              </a:ext>
+            </a:extLst>
+          </a:blip>
+          <a:stretch>
+            <a:fillRect/>
+          </a:stretch>
+        </p:blipFill>
+        <p:spPr>
+          <a:xfrm>
+            <a:off x="1079786" y="1923327"/>
+            <a:ext cx="6984427" cy="3876110"/>
+          </a:xfrm>
+          <a:prstGeom prst="rect">
+            <a:avLst/>
+          </a:prstGeom>
+        </p:spPr>
+      </p:pic>
     </p:spTree>
     <p:extLst>
       <p:ext uri="{BB962C8B-B14F-4D97-AF65-F5344CB8AC3E}">
-        <p14:creationId xmlns:p14="http://schemas.microsoft.com/office/powerpoint/2010/main" val="3926115087"/>
+        <p14:creationId xmlns:p14="http://schemas.microsoft.com/office/powerpoint/2010/main" val="3277137142"/>
       </p:ext>
     </p:extLst>
   </p:cSld>

</xml_diff>